<commit_message>
Updated presentation to fix errors
</commit_message>
<xml_diff>
--- a/WhatIsNewInDotnetCore-TechDaysFinland-2020.pptx
+++ b/WhatIsNewInDotnetCore-TechDaysFinland-2020.pptx
@@ -2838,13 +2838,6 @@
         </dgm:presLayoutVars>
       </dgm:prSet>
       <dgm:spPr/>
-      <dgm:t>
-        <a:bodyPr/>
-        <a:lstStyle/>
-        <a:p>
-          <a:endParaRPr lang="en-US"/>
-        </a:p>
-      </dgm:t>
     </dgm:pt>
     <dgm:pt modelId="{7D4C3627-8151-47CF-AE72-3C5148857CA8}" type="pres">
       <dgm:prSet presAssocID="{997DAF91-D804-4FE6-ABB8-56A35C41A15D}" presName="parTxOnlySpace" presStyleCnt="0"/>
@@ -2859,13 +2852,6 @@
         </dgm:presLayoutVars>
       </dgm:prSet>
       <dgm:spPr/>
-      <dgm:t>
-        <a:bodyPr/>
-        <a:lstStyle/>
-        <a:p>
-          <a:endParaRPr lang="en-US"/>
-        </a:p>
-      </dgm:t>
     </dgm:pt>
     <dgm:pt modelId="{CBB6528F-C89F-4762-A280-340A51D81D7B}" type="pres">
       <dgm:prSet presAssocID="{BBC5597C-7726-4843-AB18-9F8F5120DDA6}" presName="parTxOnlySpace" presStyleCnt="0"/>
@@ -2880,13 +2866,6 @@
         </dgm:presLayoutVars>
       </dgm:prSet>
       <dgm:spPr/>
-      <dgm:t>
-        <a:bodyPr/>
-        <a:lstStyle/>
-        <a:p>
-          <a:endParaRPr lang="en-US"/>
-        </a:p>
-      </dgm:t>
     </dgm:pt>
     <dgm:pt modelId="{480CFBCD-2618-4EF4-A9D6-596FCF58280E}" type="pres">
       <dgm:prSet presAssocID="{3AB3D245-9C06-409D-B73A-D33744A9B603}" presName="parTxOnlySpace" presStyleCnt="0"/>
@@ -2901,13 +2880,6 @@
         </dgm:presLayoutVars>
       </dgm:prSet>
       <dgm:spPr/>
-      <dgm:t>
-        <a:bodyPr/>
-        <a:lstStyle/>
-        <a:p>
-          <a:endParaRPr lang="en-US"/>
-        </a:p>
-      </dgm:t>
     </dgm:pt>
     <dgm:pt modelId="{3DF19AF7-E28D-495D-8ADF-91CAF8E215B1}" type="pres">
       <dgm:prSet presAssocID="{A659A3DF-D3E4-4EC1-890B-C1391B617CBB}" presName="parTxOnlySpace" presStyleCnt="0"/>
@@ -2922,13 +2894,6 @@
         </dgm:presLayoutVars>
       </dgm:prSet>
       <dgm:spPr/>
-      <dgm:t>
-        <a:bodyPr/>
-        <a:lstStyle/>
-        <a:p>
-          <a:endParaRPr lang="en-US"/>
-        </a:p>
-      </dgm:t>
     </dgm:pt>
     <dgm:pt modelId="{E4B1439B-0C23-473B-9263-750F706D13B5}" type="pres">
       <dgm:prSet presAssocID="{E1F0C604-825A-428F-8EC0-DB1AAC0DAD8A}" presName="parTxOnlySpace" presStyleCnt="0"/>
@@ -2943,13 +2908,6 @@
         </dgm:presLayoutVars>
       </dgm:prSet>
       <dgm:spPr/>
-      <dgm:t>
-        <a:bodyPr/>
-        <a:lstStyle/>
-        <a:p>
-          <a:endParaRPr lang="en-US"/>
-        </a:p>
-      </dgm:t>
     </dgm:pt>
     <dgm:pt modelId="{50AB8BB9-00C4-4D77-A734-1618B9457D28}" type="pres">
       <dgm:prSet presAssocID="{259CEC3F-F73A-47B6-BD8F-D4FDBCEDB6AD}" presName="parTxOnlySpace" presStyleCnt="0"/>
@@ -2964,13 +2922,6 @@
         </dgm:presLayoutVars>
       </dgm:prSet>
       <dgm:spPr/>
-      <dgm:t>
-        <a:bodyPr/>
-        <a:lstStyle/>
-        <a:p>
-          <a:endParaRPr lang="en-US"/>
-        </a:p>
-      </dgm:t>
     </dgm:pt>
     <dgm:pt modelId="{DB7274F1-BD10-4207-9735-22BC8C7DCD91}" type="pres">
       <dgm:prSet presAssocID="{1B638F9B-3C91-4A77-87AF-54E945CD4BB5}" presName="parTxOnlySpace" presStyleCnt="0"/>
@@ -2985,13 +2936,6 @@
         </dgm:presLayoutVars>
       </dgm:prSet>
       <dgm:spPr/>
-      <dgm:t>
-        <a:bodyPr/>
-        <a:lstStyle/>
-        <a:p>
-          <a:endParaRPr lang="en-US"/>
-        </a:p>
-      </dgm:t>
     </dgm:pt>
     <dgm:pt modelId="{A9B8DE4C-EF23-4A00-8550-E6E0BA7FFA83}" type="pres">
       <dgm:prSet presAssocID="{4970A2B2-1EAC-4065-BC83-D636ED6F82B8}" presName="parTxOnlySpace" presStyleCnt="0"/>
@@ -3006,13 +2950,6 @@
         </dgm:presLayoutVars>
       </dgm:prSet>
       <dgm:spPr/>
-      <dgm:t>
-        <a:bodyPr/>
-        <a:lstStyle/>
-        <a:p>
-          <a:endParaRPr lang="en-US"/>
-        </a:p>
-      </dgm:t>
     </dgm:pt>
     <dgm:pt modelId="{749085F0-78E5-4AC3-B80C-C79B1215E028}" type="pres">
       <dgm:prSet presAssocID="{6D5D2117-B803-461E-AD43-AF81A4864581}" presName="parTxOnlySpace" presStyleCnt="0"/>
@@ -3027,13 +2964,6 @@
         </dgm:presLayoutVars>
       </dgm:prSet>
       <dgm:spPr/>
-      <dgm:t>
-        <a:bodyPr/>
-        <a:lstStyle/>
-        <a:p>
-          <a:endParaRPr lang="en-US"/>
-        </a:p>
-      </dgm:t>
     </dgm:pt>
     <dgm:pt modelId="{B718E74A-26D7-4B09-8610-993759EC6356}" type="pres">
       <dgm:prSet presAssocID="{CCACB43A-5AA6-450A-9896-CB678764E3E9}" presName="parTxOnlySpace" presStyleCnt="0"/>
@@ -3048,13 +2978,6 @@
         </dgm:presLayoutVars>
       </dgm:prSet>
       <dgm:spPr/>
-      <dgm:t>
-        <a:bodyPr/>
-        <a:lstStyle/>
-        <a:p>
-          <a:endParaRPr lang="en-US"/>
-        </a:p>
-      </dgm:t>
     </dgm:pt>
     <dgm:pt modelId="{DA3A2019-98C1-41A2-8B66-80128065BDAA}" type="pres">
       <dgm:prSet presAssocID="{83041A21-5EB5-460B-9071-99196876BAE7}" presName="parTxOnlySpace" presStyleCnt="0"/>
@@ -3069,41 +2992,34 @@
         </dgm:presLayoutVars>
       </dgm:prSet>
       <dgm:spPr/>
-      <dgm:t>
-        <a:bodyPr/>
-        <a:lstStyle/>
-        <a:p>
-          <a:endParaRPr lang="en-US"/>
-        </a:p>
-      </dgm:t>
     </dgm:pt>
   </dgm:ptLst>
   <dgm:cxnLst>
+    <dgm:cxn modelId="{5FC49E07-45A3-494F-B9A0-680AFB83378E}" srcId="{6D87ABAA-138A-49E0-8425-7E5703555FB6}" destId="{68CEB034-91EC-4010-B87B-326A5C172A1A}" srcOrd="5" destOrd="0" parTransId="{9CD3EEE9-74FB-4708-93F1-BF2670972E7C}" sibTransId="{259CEC3F-F73A-47B6-BD8F-D4FDBCEDB6AD}"/>
+    <dgm:cxn modelId="{90055511-8A60-4E77-9D11-154A313109F6}" srcId="{6D87ABAA-138A-49E0-8425-7E5703555FB6}" destId="{6D978962-9CC5-49E5-BE79-0DCEE24C3843}" srcOrd="6" destOrd="0" parTransId="{71A79B79-AE0D-4FBB-9C38-CA8DCC9593E7}" sibTransId="{1B638F9B-3C91-4A77-87AF-54E945CD4BB5}"/>
+    <dgm:cxn modelId="{2504B91C-AEE3-41BD-B37F-73D6E5E1E0C6}" type="presOf" srcId="{C775C697-7EA7-4413-84FA-B41300A576C4}" destId="{DE474B9C-56CA-43D0-A9D0-89628075BCA6}" srcOrd="0" destOrd="0" presId="urn:microsoft.com/office/officeart/2005/8/layout/chevron1"/>
+    <dgm:cxn modelId="{4DE67128-DCF5-44A0-A0AA-DC173A749300}" type="presOf" srcId="{6EC63CF5-2FC5-4C76-9737-97A3AD4D9441}" destId="{A31252AD-57F7-4F57-8663-2F262F6ED6D7}" srcOrd="0" destOrd="0" presId="urn:microsoft.com/office/officeart/2005/8/layout/chevron1"/>
+    <dgm:cxn modelId="{E5C64C3F-220A-40CD-B415-FA158560E71F}" type="presOf" srcId="{8335E7B9-FF39-4DA5-AD29-5A661D5823C5}" destId="{26D82732-EBBC-4F1E-83D2-A899091075C0}" srcOrd="0" destOrd="0" presId="urn:microsoft.com/office/officeart/2005/8/layout/chevron1"/>
+    <dgm:cxn modelId="{87386A5F-5317-4E28-9BC3-96CD196FEBC1}" srcId="{6D87ABAA-138A-49E0-8425-7E5703555FB6}" destId="{07500DE6-7650-4087-AA60-4C0770DE2C99}" srcOrd="11" destOrd="0" parTransId="{B96F0993-CA1D-4AC3-80FC-67B312C66BB1}" sibTransId="{4ACAC478-425B-4E98-8B27-E78ECA32A818}"/>
+    <dgm:cxn modelId="{CEFF2A62-B748-4454-865D-DEC690EB3A41}" type="presOf" srcId="{6D978962-9CC5-49E5-BE79-0DCEE24C3843}" destId="{B842399F-CD90-4E6C-BC68-154114E1EBE7}" srcOrd="0" destOrd="0" presId="urn:microsoft.com/office/officeart/2005/8/layout/chevron1"/>
+    <dgm:cxn modelId="{0952034A-7BF7-4712-91B1-EA897D9C5C77}" srcId="{6D87ABAA-138A-49E0-8425-7E5703555FB6}" destId="{F3BD1894-9716-4529-AD14-0E3A51B0464E}" srcOrd="8" destOrd="0" parTransId="{722CCDC5-24EA-462C-8C92-5298623FD05A}" sibTransId="{6D5D2117-B803-461E-AD43-AF81A4864581}"/>
+    <dgm:cxn modelId="{03E46E4B-0AE8-4C38-B69B-0BF53807C730}" srcId="{6D87ABAA-138A-49E0-8425-7E5703555FB6}" destId="{C775C697-7EA7-4413-84FA-B41300A576C4}" srcOrd="9" destOrd="0" parTransId="{80CBC051-C511-40E8-A46B-BF1F27641F3A}" sibTransId="{CCACB43A-5AA6-450A-9896-CB678764E3E9}"/>
+    <dgm:cxn modelId="{00FF5A57-8BB0-4DB3-A0D4-E260A0FBC183}" type="presOf" srcId="{6D87ABAA-138A-49E0-8425-7E5703555FB6}" destId="{0E5CA5A3-625D-4FBE-AE71-D4AC57183418}" srcOrd="0" destOrd="0" presId="urn:microsoft.com/office/officeart/2005/8/layout/chevron1"/>
+    <dgm:cxn modelId="{41130C7A-9247-42CF-8532-867C16B375A7}" srcId="{6D87ABAA-138A-49E0-8425-7E5703555FB6}" destId="{CDF70F13-4172-4C24-BC88-1ED677275EBE}" srcOrd="1" destOrd="0" parTransId="{E952A376-AC2C-4DAC-84BE-08582EA2F68A}" sibTransId="{BBC5597C-7726-4843-AB18-9F8F5120DDA6}"/>
+    <dgm:cxn modelId="{1D8D8983-4F1E-45B0-81D7-18E2C401170B}" type="presOf" srcId="{BE9D7D30-0299-44E3-9DC5-55CF7EB224ED}" destId="{B609083E-36E6-4F67-BA00-91605F4276AB}" srcOrd="0" destOrd="0" presId="urn:microsoft.com/office/officeart/2005/8/layout/chevron1"/>
+    <dgm:cxn modelId="{6985EE92-37CE-428B-BF6B-528CE4DA8FE2}" srcId="{6D87ABAA-138A-49E0-8425-7E5703555FB6}" destId="{8335E7B9-FF39-4DA5-AD29-5A661D5823C5}" srcOrd="4" destOrd="0" parTransId="{02BA5DEF-5A0A-4161-8B27-6FCD63B16A69}" sibTransId="{E1F0C604-825A-428F-8EC0-DB1AAC0DAD8A}"/>
+    <dgm:cxn modelId="{8A092AA9-A58E-4023-83E3-5C161CA45199}" type="presOf" srcId="{C91E7C19-2B33-44AA-8139-7BC787DE96BB}" destId="{11C7523D-8944-4626-8B4B-78F9EF0675DA}" srcOrd="0" destOrd="0" presId="urn:microsoft.com/office/officeart/2005/8/layout/chevron1"/>
+    <dgm:cxn modelId="{D8438FA9-6856-404C-971B-4413CE7943EE}" srcId="{6D87ABAA-138A-49E0-8425-7E5703555FB6}" destId="{BE9D7D30-0299-44E3-9DC5-55CF7EB224ED}" srcOrd="10" destOrd="0" parTransId="{1DA1B64D-3C49-478E-8CE2-F5F9B34ECA30}" sibTransId="{83041A21-5EB5-460B-9071-99196876BAE7}"/>
+    <dgm:cxn modelId="{AA269AAA-CC81-455E-96E5-DEE81477C8AB}" type="presOf" srcId="{CDF70F13-4172-4C24-BC88-1ED677275EBE}" destId="{EC66E5E7-0D31-4692-BAA4-3231F2FB0770}" srcOrd="0" destOrd="0" presId="urn:microsoft.com/office/officeart/2005/8/layout/chevron1"/>
+    <dgm:cxn modelId="{585BDBAC-A081-4F15-ADB3-2EDAA46DF379}" srcId="{6D87ABAA-138A-49E0-8425-7E5703555FB6}" destId="{C91E7C19-2B33-44AA-8139-7BC787DE96BB}" srcOrd="2" destOrd="0" parTransId="{227912CD-03E6-4AC1-8E3C-646394877243}" sibTransId="{3AB3D245-9C06-409D-B73A-D33744A9B603}"/>
+    <dgm:cxn modelId="{09D527AF-BF9B-4339-AB27-24901AFBF98D}" srcId="{6D87ABAA-138A-49E0-8425-7E5703555FB6}" destId="{6EC63CF5-2FC5-4C76-9737-97A3AD4D9441}" srcOrd="0" destOrd="0" parTransId="{35BB0890-E3BC-4954-86F3-421078268939}" sibTransId="{997DAF91-D804-4FE6-ABB8-56A35C41A15D}"/>
+    <dgm:cxn modelId="{0F7A5CB3-A933-4D38-9417-3DD00C7CCFD4}" type="presOf" srcId="{68CEB034-91EC-4010-B87B-326A5C172A1A}" destId="{126339F4-4065-4CDC-9732-16B3DD263CA7}" srcOrd="0" destOrd="0" presId="urn:microsoft.com/office/officeart/2005/8/layout/chevron1"/>
     <dgm:cxn modelId="{543D07BA-9F93-4083-9FB8-ABBFFC195730}" type="presOf" srcId="{F3BD1894-9716-4529-AD14-0E3A51B0464E}" destId="{409D8E13-29FD-4EF2-90C3-8847843B960B}" srcOrd="0" destOrd="0" presId="urn:microsoft.com/office/officeart/2005/8/layout/chevron1"/>
-    <dgm:cxn modelId="{AA269AAA-CC81-455E-96E5-DEE81477C8AB}" type="presOf" srcId="{CDF70F13-4172-4C24-BC88-1ED677275EBE}" destId="{EC66E5E7-0D31-4692-BAA4-3231F2FB0770}" srcOrd="0" destOrd="0" presId="urn:microsoft.com/office/officeart/2005/8/layout/chevron1"/>
-    <dgm:cxn modelId="{87386A5F-5317-4E28-9BC3-96CD196FEBC1}" srcId="{6D87ABAA-138A-49E0-8425-7E5703555FB6}" destId="{07500DE6-7650-4087-AA60-4C0770DE2C99}" srcOrd="11" destOrd="0" parTransId="{B96F0993-CA1D-4AC3-80FC-67B312C66BB1}" sibTransId="{4ACAC478-425B-4E98-8B27-E78ECA32A818}"/>
-    <dgm:cxn modelId="{D8438FA9-6856-404C-971B-4413CE7943EE}" srcId="{6D87ABAA-138A-49E0-8425-7E5703555FB6}" destId="{BE9D7D30-0299-44E3-9DC5-55CF7EB224ED}" srcOrd="10" destOrd="0" parTransId="{1DA1B64D-3C49-478E-8CE2-F5F9B34ECA30}" sibTransId="{83041A21-5EB5-460B-9071-99196876BAE7}"/>
-    <dgm:cxn modelId="{E5C64C3F-220A-40CD-B415-FA158560E71F}" type="presOf" srcId="{8335E7B9-FF39-4DA5-AD29-5A661D5823C5}" destId="{26D82732-EBBC-4F1E-83D2-A899091075C0}" srcOrd="0" destOrd="0" presId="urn:microsoft.com/office/officeart/2005/8/layout/chevron1"/>
+    <dgm:cxn modelId="{253355C9-30A7-44A5-8B1E-C947E5B147BF}" srcId="{6D87ABAA-138A-49E0-8425-7E5703555FB6}" destId="{E27B1CAB-D71A-4F7F-B33C-4AA1BACA32CB}" srcOrd="7" destOrd="0" parTransId="{5A96E7B1-33FF-4443-9C1C-1913BE979273}" sibTransId="{4970A2B2-1EAC-4065-BC83-D636ED6F82B8}"/>
+    <dgm:cxn modelId="{96CB1EE7-60D8-4471-880F-AD2A9755DFC6}" type="presOf" srcId="{72D8022F-4AA9-420B-8145-4EA27637138E}" destId="{ED2E401D-0E51-4F8C-89DE-0B24BEF4F5F5}" srcOrd="0" destOrd="0" presId="urn:microsoft.com/office/officeart/2005/8/layout/chevron1"/>
+    <dgm:cxn modelId="{9C5471E7-5461-4CBD-90CC-0275E7ED0536}" type="presOf" srcId="{E27B1CAB-D71A-4F7F-B33C-4AA1BACA32CB}" destId="{E6F49FDE-5EC6-444C-B194-98DF065C4F17}" srcOrd="0" destOrd="0" presId="urn:microsoft.com/office/officeart/2005/8/layout/chevron1"/>
+    <dgm:cxn modelId="{47D86FEF-098E-459D-8B88-13F6859D380A}" type="presOf" srcId="{07500DE6-7650-4087-AA60-4C0770DE2C99}" destId="{D96C1BE4-C9E9-40C6-A063-D0DD1C82972F}" srcOrd="0" destOrd="0" presId="urn:microsoft.com/office/officeart/2005/8/layout/chevron1"/>
     <dgm:cxn modelId="{0E360CF0-4759-41AF-BE82-4EBB2D68F314}" srcId="{6D87ABAA-138A-49E0-8425-7E5703555FB6}" destId="{72D8022F-4AA9-420B-8145-4EA27637138E}" srcOrd="3" destOrd="0" parTransId="{4586B75D-F9F8-4E67-AF42-8A6EC2797678}" sibTransId="{A659A3DF-D3E4-4EC1-890B-C1391B617CBB}"/>
-    <dgm:cxn modelId="{09D527AF-BF9B-4339-AB27-24901AFBF98D}" srcId="{6D87ABAA-138A-49E0-8425-7E5703555FB6}" destId="{6EC63CF5-2FC5-4C76-9737-97A3AD4D9441}" srcOrd="0" destOrd="0" parTransId="{35BB0890-E3BC-4954-86F3-421078268939}" sibTransId="{997DAF91-D804-4FE6-ABB8-56A35C41A15D}"/>
-    <dgm:cxn modelId="{1D8D8983-4F1E-45B0-81D7-18E2C401170B}" type="presOf" srcId="{BE9D7D30-0299-44E3-9DC5-55CF7EB224ED}" destId="{B609083E-36E6-4F67-BA00-91605F4276AB}" srcOrd="0" destOrd="0" presId="urn:microsoft.com/office/officeart/2005/8/layout/chevron1"/>
-    <dgm:cxn modelId="{00FF5A57-8BB0-4DB3-A0D4-E260A0FBC183}" type="presOf" srcId="{6D87ABAA-138A-49E0-8425-7E5703555FB6}" destId="{0E5CA5A3-625D-4FBE-AE71-D4AC57183418}" srcOrd="0" destOrd="0" presId="urn:microsoft.com/office/officeart/2005/8/layout/chevron1"/>
-    <dgm:cxn modelId="{96CB1EE7-60D8-4471-880F-AD2A9755DFC6}" type="presOf" srcId="{72D8022F-4AA9-420B-8145-4EA27637138E}" destId="{ED2E401D-0E51-4F8C-89DE-0B24BEF4F5F5}" srcOrd="0" destOrd="0" presId="urn:microsoft.com/office/officeart/2005/8/layout/chevron1"/>
-    <dgm:cxn modelId="{90055511-8A60-4E77-9D11-154A313109F6}" srcId="{6D87ABAA-138A-49E0-8425-7E5703555FB6}" destId="{6D978962-9CC5-49E5-BE79-0DCEE24C3843}" srcOrd="6" destOrd="0" parTransId="{71A79B79-AE0D-4FBB-9C38-CA8DCC9593E7}" sibTransId="{1B638F9B-3C91-4A77-87AF-54E945CD4BB5}"/>
-    <dgm:cxn modelId="{6985EE92-37CE-428B-BF6B-528CE4DA8FE2}" srcId="{6D87ABAA-138A-49E0-8425-7E5703555FB6}" destId="{8335E7B9-FF39-4DA5-AD29-5A661D5823C5}" srcOrd="4" destOrd="0" parTransId="{02BA5DEF-5A0A-4161-8B27-6FCD63B16A69}" sibTransId="{E1F0C604-825A-428F-8EC0-DB1AAC0DAD8A}"/>
-    <dgm:cxn modelId="{4DE67128-DCF5-44A0-A0AA-DC173A749300}" type="presOf" srcId="{6EC63CF5-2FC5-4C76-9737-97A3AD4D9441}" destId="{A31252AD-57F7-4F57-8663-2F262F6ED6D7}" srcOrd="0" destOrd="0" presId="urn:microsoft.com/office/officeart/2005/8/layout/chevron1"/>
-    <dgm:cxn modelId="{0F7A5CB3-A933-4D38-9417-3DD00C7CCFD4}" type="presOf" srcId="{68CEB034-91EC-4010-B87B-326A5C172A1A}" destId="{126339F4-4065-4CDC-9732-16B3DD263CA7}" srcOrd="0" destOrd="0" presId="urn:microsoft.com/office/officeart/2005/8/layout/chevron1"/>
-    <dgm:cxn modelId="{5FC49E07-45A3-494F-B9A0-680AFB83378E}" srcId="{6D87ABAA-138A-49E0-8425-7E5703555FB6}" destId="{68CEB034-91EC-4010-B87B-326A5C172A1A}" srcOrd="5" destOrd="0" parTransId="{9CD3EEE9-74FB-4708-93F1-BF2670972E7C}" sibTransId="{259CEC3F-F73A-47B6-BD8F-D4FDBCEDB6AD}"/>
-    <dgm:cxn modelId="{9C5471E7-5461-4CBD-90CC-0275E7ED0536}" type="presOf" srcId="{E27B1CAB-D71A-4F7F-B33C-4AA1BACA32CB}" destId="{E6F49FDE-5EC6-444C-B194-98DF065C4F17}" srcOrd="0" destOrd="0" presId="urn:microsoft.com/office/officeart/2005/8/layout/chevron1"/>
-    <dgm:cxn modelId="{0952034A-7BF7-4712-91B1-EA897D9C5C77}" srcId="{6D87ABAA-138A-49E0-8425-7E5703555FB6}" destId="{F3BD1894-9716-4529-AD14-0E3A51B0464E}" srcOrd="8" destOrd="0" parTransId="{722CCDC5-24EA-462C-8C92-5298623FD05A}" sibTransId="{6D5D2117-B803-461E-AD43-AF81A4864581}"/>
-    <dgm:cxn modelId="{253355C9-30A7-44A5-8B1E-C947E5B147BF}" srcId="{6D87ABAA-138A-49E0-8425-7E5703555FB6}" destId="{E27B1CAB-D71A-4F7F-B33C-4AA1BACA32CB}" srcOrd="7" destOrd="0" parTransId="{5A96E7B1-33FF-4443-9C1C-1913BE979273}" sibTransId="{4970A2B2-1EAC-4065-BC83-D636ED6F82B8}"/>
-    <dgm:cxn modelId="{47D86FEF-098E-459D-8B88-13F6859D380A}" type="presOf" srcId="{07500DE6-7650-4087-AA60-4C0770DE2C99}" destId="{D96C1BE4-C9E9-40C6-A063-D0DD1C82972F}" srcOrd="0" destOrd="0" presId="urn:microsoft.com/office/officeart/2005/8/layout/chevron1"/>
-    <dgm:cxn modelId="{03E46E4B-0AE8-4C38-B69B-0BF53807C730}" srcId="{6D87ABAA-138A-49E0-8425-7E5703555FB6}" destId="{C775C697-7EA7-4413-84FA-B41300A576C4}" srcOrd="9" destOrd="0" parTransId="{80CBC051-C511-40E8-A46B-BF1F27641F3A}" sibTransId="{CCACB43A-5AA6-450A-9896-CB678764E3E9}"/>
-    <dgm:cxn modelId="{585BDBAC-A081-4F15-ADB3-2EDAA46DF379}" srcId="{6D87ABAA-138A-49E0-8425-7E5703555FB6}" destId="{C91E7C19-2B33-44AA-8139-7BC787DE96BB}" srcOrd="2" destOrd="0" parTransId="{227912CD-03E6-4AC1-8E3C-646394877243}" sibTransId="{3AB3D245-9C06-409D-B73A-D33744A9B603}"/>
-    <dgm:cxn modelId="{2504B91C-AEE3-41BD-B37F-73D6E5E1E0C6}" type="presOf" srcId="{C775C697-7EA7-4413-84FA-B41300A576C4}" destId="{DE474B9C-56CA-43D0-A9D0-89628075BCA6}" srcOrd="0" destOrd="0" presId="urn:microsoft.com/office/officeart/2005/8/layout/chevron1"/>
-    <dgm:cxn modelId="{CEFF2A62-B748-4454-865D-DEC690EB3A41}" type="presOf" srcId="{6D978962-9CC5-49E5-BE79-0DCEE24C3843}" destId="{B842399F-CD90-4E6C-BC68-154114E1EBE7}" srcOrd="0" destOrd="0" presId="urn:microsoft.com/office/officeart/2005/8/layout/chevron1"/>
-    <dgm:cxn modelId="{41130C7A-9247-42CF-8532-867C16B375A7}" srcId="{6D87ABAA-138A-49E0-8425-7E5703555FB6}" destId="{CDF70F13-4172-4C24-BC88-1ED677275EBE}" srcOrd="1" destOrd="0" parTransId="{E952A376-AC2C-4DAC-84BE-08582EA2F68A}" sibTransId="{BBC5597C-7726-4843-AB18-9F8F5120DDA6}"/>
-    <dgm:cxn modelId="{8A092AA9-A58E-4023-83E3-5C161CA45199}" type="presOf" srcId="{C91E7C19-2B33-44AA-8139-7BC787DE96BB}" destId="{11C7523D-8944-4626-8B4B-78F9EF0675DA}" srcOrd="0" destOrd="0" presId="urn:microsoft.com/office/officeart/2005/8/layout/chevron1"/>
     <dgm:cxn modelId="{9AE93C76-41DE-4720-8B10-A3E371851BD4}" type="presParOf" srcId="{0E5CA5A3-625D-4FBE-AE71-D4AC57183418}" destId="{A31252AD-57F7-4F57-8663-2F262F6ED6D7}" srcOrd="0" destOrd="0" presId="urn:microsoft.com/office/officeart/2005/8/layout/chevron1"/>
     <dgm:cxn modelId="{868CFA9E-7AC0-4779-A015-51A77C1DBA83}" type="presParOf" srcId="{0E5CA5A3-625D-4FBE-AE71-D4AC57183418}" destId="{7D4C3627-8151-47CF-AE72-3C5148857CA8}" srcOrd="1" destOrd="0" presId="urn:microsoft.com/office/officeart/2005/8/layout/chevron1"/>
     <dgm:cxn modelId="{D1F3412D-D85E-44DC-A3AB-E0E8F19FFA0B}" type="presParOf" srcId="{0E5CA5A3-625D-4FBE-AE71-D4AC57183418}" destId="{EC66E5E7-0D31-4692-BAA4-3231F2FB0770}" srcOrd="2" destOrd="0" presId="urn:microsoft.com/office/officeart/2005/8/layout/chevron1"/>
@@ -3424,13 +3340,6 @@
         </dgm:presLayoutVars>
       </dgm:prSet>
       <dgm:spPr/>
-      <dgm:t>
-        <a:bodyPr/>
-        <a:lstStyle/>
-        <a:p>
-          <a:endParaRPr lang="en-US"/>
-        </a:p>
-      </dgm:t>
     </dgm:pt>
     <dgm:pt modelId="{7D4C3627-8151-47CF-AE72-3C5148857CA8}" type="pres">
       <dgm:prSet presAssocID="{997DAF91-D804-4FE6-ABB8-56A35C41A15D}" presName="parTxOnlySpace" presStyleCnt="0"/>
@@ -3445,13 +3354,6 @@
         </dgm:presLayoutVars>
       </dgm:prSet>
       <dgm:spPr/>
-      <dgm:t>
-        <a:bodyPr/>
-        <a:lstStyle/>
-        <a:p>
-          <a:endParaRPr lang="en-US"/>
-        </a:p>
-      </dgm:t>
     </dgm:pt>
     <dgm:pt modelId="{0DE5CE91-A1F9-4940-AA68-39DE2D4D93BE}" type="pres">
       <dgm:prSet presAssocID="{1B858AD5-7976-4BCC-ADF4-63C670AADE24}" presName="parTxOnlySpace" presStyleCnt="0"/>
@@ -3466,13 +3368,6 @@
         </dgm:presLayoutVars>
       </dgm:prSet>
       <dgm:spPr/>
-      <dgm:t>
-        <a:bodyPr/>
-        <a:lstStyle/>
-        <a:p>
-          <a:endParaRPr lang="en-US"/>
-        </a:p>
-      </dgm:t>
     </dgm:pt>
     <dgm:pt modelId="{E45E3954-5545-465E-849B-FA9A21B746AF}" type="pres">
       <dgm:prSet presAssocID="{9D1E7A3F-B7C3-494B-B9E3-559553085EE4}" presName="parTxOnlySpace" presStyleCnt="0"/>
@@ -3487,13 +3382,6 @@
         </dgm:presLayoutVars>
       </dgm:prSet>
       <dgm:spPr/>
-      <dgm:t>
-        <a:bodyPr/>
-        <a:lstStyle/>
-        <a:p>
-          <a:endParaRPr lang="en-US"/>
-        </a:p>
-      </dgm:t>
     </dgm:pt>
     <dgm:pt modelId="{E175E9C4-317E-4F2E-AE76-42046D2DC945}" type="pres">
       <dgm:prSet presAssocID="{F6E4A079-B416-4514-8DD1-0E0908BA660B}" presName="parTxOnlySpace" presStyleCnt="0"/>
@@ -3508,13 +3396,6 @@
         </dgm:presLayoutVars>
       </dgm:prSet>
       <dgm:spPr/>
-      <dgm:t>
-        <a:bodyPr/>
-        <a:lstStyle/>
-        <a:p>
-          <a:endParaRPr lang="en-US"/>
-        </a:p>
-      </dgm:t>
     </dgm:pt>
     <dgm:pt modelId="{2BF8C400-2740-4480-9D26-FF745F8EA64D}" type="pres">
       <dgm:prSet presAssocID="{5AED6C24-5318-4977-A3D2-4E011066A4FC}" presName="parTxOnlySpace" presStyleCnt="0"/>
@@ -3529,13 +3410,6 @@
         </dgm:presLayoutVars>
       </dgm:prSet>
       <dgm:spPr/>
-      <dgm:t>
-        <a:bodyPr/>
-        <a:lstStyle/>
-        <a:p>
-          <a:endParaRPr lang="en-US"/>
-        </a:p>
-      </dgm:t>
     </dgm:pt>
     <dgm:pt modelId="{8FB89BE3-FCD8-409A-BDF3-D5289970B4F5}" type="pres">
       <dgm:prSet presAssocID="{933484CB-5F76-4E11-B99B-62A74236EA7D}" presName="parTxOnlySpace" presStyleCnt="0"/>
@@ -3550,31 +3424,24 @@
         </dgm:presLayoutVars>
       </dgm:prSet>
       <dgm:spPr/>
-      <dgm:t>
-        <a:bodyPr/>
-        <a:lstStyle/>
-        <a:p>
-          <a:endParaRPr lang="en-US"/>
-        </a:p>
-      </dgm:t>
     </dgm:pt>
   </dgm:ptLst>
   <dgm:cxnLst>
+    <dgm:cxn modelId="{30DB1D05-BEFE-4FD7-9E87-CCA0436BD242}" srcId="{6D87ABAA-138A-49E0-8425-7E5703555FB6}" destId="{EF5015CC-FB8B-4D00-BFBD-FCABAA3CA264}" srcOrd="2" destOrd="0" parTransId="{AC14BBB5-5C1C-4438-9164-A5427EA8BC67}" sibTransId="{9D1E7A3F-B7C3-494B-B9E3-559553085EE4}"/>
+    <dgm:cxn modelId="{7C29661B-DC4C-4186-A024-0E35A0D3FA77}" srcId="{6D87ABAA-138A-49E0-8425-7E5703555FB6}" destId="{F6A03B55-698C-4E4F-A7ED-EB7BF267B7AC}" srcOrd="6" destOrd="0" parTransId="{85EC6176-051D-468C-8EF4-4691CBD82F54}" sibTransId="{2153103B-1261-4498-B0A8-EAE592C41828}"/>
+    <dgm:cxn modelId="{4DE67128-DCF5-44A0-A0AA-DC173A749300}" type="presOf" srcId="{6EC63CF5-2FC5-4C76-9737-97A3AD4D9441}" destId="{A31252AD-57F7-4F57-8663-2F262F6ED6D7}" srcOrd="0" destOrd="0" presId="urn:microsoft.com/office/officeart/2005/8/layout/chevron1"/>
+    <dgm:cxn modelId="{E3433960-71CC-44C8-A8CE-1744BDE3846E}" type="presOf" srcId="{AD999677-3CE6-470F-842A-BE6E4E8491EB}" destId="{4AFCE2F3-657B-47E4-9D55-0E6BCD859BCD}" srcOrd="0" destOrd="0" presId="urn:microsoft.com/office/officeart/2005/8/layout/chevron1"/>
+    <dgm:cxn modelId="{67FEA971-D047-49A9-837D-C10E8BB58C6D}" type="presOf" srcId="{D3FF209E-60DA-4104-BB6A-FDC8839659AC}" destId="{F089B48A-31E1-40AB-9AAD-C133681EB50E}" srcOrd="0" destOrd="0" presId="urn:microsoft.com/office/officeart/2005/8/layout/chevron1"/>
     <dgm:cxn modelId="{00FF5A57-8BB0-4DB3-A0D4-E260A0FBC183}" type="presOf" srcId="{6D87ABAA-138A-49E0-8425-7E5703555FB6}" destId="{0E5CA5A3-625D-4FBE-AE71-D4AC57183418}" srcOrd="0" destOrd="0" presId="urn:microsoft.com/office/officeart/2005/8/layout/chevron1"/>
-    <dgm:cxn modelId="{E3433960-71CC-44C8-A8CE-1744BDE3846E}" type="presOf" srcId="{AD999677-3CE6-470F-842A-BE6E4E8491EB}" destId="{4AFCE2F3-657B-47E4-9D55-0E6BCD859BCD}" srcOrd="0" destOrd="0" presId="urn:microsoft.com/office/officeart/2005/8/layout/chevron1"/>
-    <dgm:cxn modelId="{348135B0-B3A0-4AAD-9AAF-B7699F58CE4D}" type="presOf" srcId="{F6A03B55-698C-4E4F-A7ED-EB7BF267B7AC}" destId="{06C6B110-908B-4124-BFD6-BF4889299C57}" srcOrd="0" destOrd="0" presId="urn:microsoft.com/office/officeart/2005/8/layout/chevron1"/>
-    <dgm:cxn modelId="{7C29661B-DC4C-4186-A024-0E35A0D3FA77}" srcId="{6D87ABAA-138A-49E0-8425-7E5703555FB6}" destId="{F6A03B55-698C-4E4F-A7ED-EB7BF267B7AC}" srcOrd="6" destOrd="0" parTransId="{85EC6176-051D-468C-8EF4-4691CBD82F54}" sibTransId="{2153103B-1261-4498-B0A8-EAE592C41828}"/>
-    <dgm:cxn modelId="{5DCB6DFF-FFCB-4CF4-B8B9-92EDD0A07A4E}" type="presOf" srcId="{372C72E1-B6B8-49EA-B6DD-A4D44649B183}" destId="{11BB96B5-B568-4985-92CA-A0F9CE62D10F}" srcOrd="0" destOrd="0" presId="urn:microsoft.com/office/officeart/2005/8/layout/chevron1"/>
-    <dgm:cxn modelId="{09D527AF-BF9B-4339-AB27-24901AFBF98D}" srcId="{6D87ABAA-138A-49E0-8425-7E5703555FB6}" destId="{6EC63CF5-2FC5-4C76-9737-97A3AD4D9441}" srcOrd="0" destOrd="0" parTransId="{35BB0890-E3BC-4954-86F3-421078268939}" sibTransId="{997DAF91-D804-4FE6-ABB8-56A35C41A15D}"/>
+    <dgm:cxn modelId="{7EC3DE91-CBE7-4533-9A73-1D09E4436916}" srcId="{6D87ABAA-138A-49E0-8425-7E5703555FB6}" destId="{372C72E1-B6B8-49EA-B6DD-A4D44649B183}" srcOrd="1" destOrd="0" parTransId="{4373B377-1051-40D5-812C-13BDFBC15BDB}" sibTransId="{1B858AD5-7976-4BCC-ADF4-63C670AADE24}"/>
     <dgm:cxn modelId="{1B00DB9E-42C2-4E36-8CBD-50632B8B4B61}" srcId="{6D87ABAA-138A-49E0-8425-7E5703555FB6}" destId="{AD999677-3CE6-470F-842A-BE6E4E8491EB}" srcOrd="3" destOrd="0" parTransId="{FA71A363-BD53-4C6B-82E2-C537AAB512E7}" sibTransId="{F6E4A079-B416-4514-8DD1-0E0908BA660B}"/>
     <dgm:cxn modelId="{806D03A2-77D4-4575-BC65-32EB721266E8}" srcId="{6D87ABAA-138A-49E0-8425-7E5703555FB6}" destId="{90B0480C-9D3A-4F83-8A59-81552EF5C134}" srcOrd="5" destOrd="0" parTransId="{5A312A29-0DCA-4892-8C04-17128FC374CA}" sibTransId="{933484CB-5F76-4E11-B99B-62A74236EA7D}"/>
+    <dgm:cxn modelId="{406676A3-1810-4DBB-858E-909DA6A1B10D}" type="presOf" srcId="{90B0480C-9D3A-4F83-8A59-81552EF5C134}" destId="{1537832F-0845-4308-9321-8068B2886C8C}" srcOrd="0" destOrd="0" presId="urn:microsoft.com/office/officeart/2005/8/layout/chevron1"/>
+    <dgm:cxn modelId="{415965A4-4BF1-43E0-A487-B1F33759E06F}" type="presOf" srcId="{EF5015CC-FB8B-4D00-BFBD-FCABAA3CA264}" destId="{A62AF41F-23D5-49FB-80E3-A26D454D5A9B}" srcOrd="0" destOrd="0" presId="urn:microsoft.com/office/officeart/2005/8/layout/chevron1"/>
+    <dgm:cxn modelId="{09D527AF-BF9B-4339-AB27-24901AFBF98D}" srcId="{6D87ABAA-138A-49E0-8425-7E5703555FB6}" destId="{6EC63CF5-2FC5-4C76-9737-97A3AD4D9441}" srcOrd="0" destOrd="0" parTransId="{35BB0890-E3BC-4954-86F3-421078268939}" sibTransId="{997DAF91-D804-4FE6-ABB8-56A35C41A15D}"/>
+    <dgm:cxn modelId="{348135B0-B3A0-4AAD-9AAF-B7699F58CE4D}" type="presOf" srcId="{F6A03B55-698C-4E4F-A7ED-EB7BF267B7AC}" destId="{06C6B110-908B-4124-BFD6-BF4889299C57}" srcOrd="0" destOrd="0" presId="urn:microsoft.com/office/officeart/2005/8/layout/chevron1"/>
     <dgm:cxn modelId="{E2CE66F3-833A-48F1-A538-D98CF245396B}" srcId="{6D87ABAA-138A-49E0-8425-7E5703555FB6}" destId="{D3FF209E-60DA-4104-BB6A-FDC8839659AC}" srcOrd="4" destOrd="0" parTransId="{5C529070-5FCF-4BB7-8DDB-32D327A70883}" sibTransId="{5AED6C24-5318-4977-A3D2-4E011066A4FC}"/>
-    <dgm:cxn modelId="{406676A3-1810-4DBB-858E-909DA6A1B10D}" type="presOf" srcId="{90B0480C-9D3A-4F83-8A59-81552EF5C134}" destId="{1537832F-0845-4308-9321-8068B2886C8C}" srcOrd="0" destOrd="0" presId="urn:microsoft.com/office/officeart/2005/8/layout/chevron1"/>
-    <dgm:cxn modelId="{30DB1D05-BEFE-4FD7-9E87-CCA0436BD242}" srcId="{6D87ABAA-138A-49E0-8425-7E5703555FB6}" destId="{EF5015CC-FB8B-4D00-BFBD-FCABAA3CA264}" srcOrd="2" destOrd="0" parTransId="{AC14BBB5-5C1C-4438-9164-A5427EA8BC67}" sibTransId="{9D1E7A3F-B7C3-494B-B9E3-559553085EE4}"/>
-    <dgm:cxn modelId="{67FEA971-D047-49A9-837D-C10E8BB58C6D}" type="presOf" srcId="{D3FF209E-60DA-4104-BB6A-FDC8839659AC}" destId="{F089B48A-31E1-40AB-9AAD-C133681EB50E}" srcOrd="0" destOrd="0" presId="urn:microsoft.com/office/officeart/2005/8/layout/chevron1"/>
-    <dgm:cxn modelId="{415965A4-4BF1-43E0-A487-B1F33759E06F}" type="presOf" srcId="{EF5015CC-FB8B-4D00-BFBD-FCABAA3CA264}" destId="{A62AF41F-23D5-49FB-80E3-A26D454D5A9B}" srcOrd="0" destOrd="0" presId="urn:microsoft.com/office/officeart/2005/8/layout/chevron1"/>
-    <dgm:cxn modelId="{4DE67128-DCF5-44A0-A0AA-DC173A749300}" type="presOf" srcId="{6EC63CF5-2FC5-4C76-9737-97A3AD4D9441}" destId="{A31252AD-57F7-4F57-8663-2F262F6ED6D7}" srcOrd="0" destOrd="0" presId="urn:microsoft.com/office/officeart/2005/8/layout/chevron1"/>
-    <dgm:cxn modelId="{7EC3DE91-CBE7-4533-9A73-1D09E4436916}" srcId="{6D87ABAA-138A-49E0-8425-7E5703555FB6}" destId="{372C72E1-B6B8-49EA-B6DD-A4D44649B183}" srcOrd="1" destOrd="0" parTransId="{4373B377-1051-40D5-812C-13BDFBC15BDB}" sibTransId="{1B858AD5-7976-4BCC-ADF4-63C670AADE24}"/>
+    <dgm:cxn modelId="{5DCB6DFF-FFCB-4CF4-B8B9-92EDD0A07A4E}" type="presOf" srcId="{372C72E1-B6B8-49EA-B6DD-A4D44649B183}" destId="{11BB96B5-B568-4985-92CA-A0F9CE62D10F}" srcOrd="0" destOrd="0" presId="urn:microsoft.com/office/officeart/2005/8/layout/chevron1"/>
     <dgm:cxn modelId="{9AE93C76-41DE-4720-8B10-A3E371851BD4}" type="presParOf" srcId="{0E5CA5A3-625D-4FBE-AE71-D4AC57183418}" destId="{A31252AD-57F7-4F57-8663-2F262F6ED6D7}" srcOrd="0" destOrd="0" presId="urn:microsoft.com/office/officeart/2005/8/layout/chevron1"/>
     <dgm:cxn modelId="{85546125-4E56-46D8-AF06-0801EF9B4BF6}" type="presParOf" srcId="{0E5CA5A3-625D-4FBE-AE71-D4AC57183418}" destId="{7D4C3627-8151-47CF-AE72-3C5148857CA8}" srcOrd="1" destOrd="0" presId="urn:microsoft.com/office/officeart/2005/8/layout/chevron1"/>
     <dgm:cxn modelId="{5BA80F19-32D3-44B9-A050-1226F33BDE13}" type="presParOf" srcId="{0E5CA5A3-625D-4FBE-AE71-D4AC57183418}" destId="{11BB96B5-B568-4985-92CA-A0F9CE62D10F}" srcOrd="2" destOrd="0" presId="urn:microsoft.com/office/officeart/2005/8/layout/chevron1"/>
@@ -3637,18 +3504,13 @@
         <a:lstStyle/>
         <a:p>
           <a:r>
-            <a:rPr lang="en-US" b="1" dirty="0" smtClean="0">
+            <a:rPr lang="en-US" b="1" dirty="0">
               <a:solidFill>
                 <a:schemeClr val="bg1"/>
               </a:solidFill>
             </a:rPr>
             <a:t>11/2020 .NET Core 5.0</a:t>
           </a:r>
-          <a:endParaRPr lang="en-US" b="1" dirty="0">
-            <a:solidFill>
-              <a:schemeClr val="bg1"/>
-            </a:solidFill>
-          </a:endParaRPr>
         </a:p>
       </dgm:t>
     </dgm:pt>
@@ -3698,7 +3560,7 @@
         <a:lstStyle/>
         <a:p>
           <a:r>
-            <a:rPr lang="en-US" b="1" dirty="0" smtClean="0">
+            <a:rPr lang="en-US" b="1" dirty="0">
               <a:solidFill>
                 <a:schemeClr val="bg1"/>
               </a:solidFill>
@@ -3708,18 +3570,13 @@
         </a:p>
         <a:p>
           <a:r>
-            <a:rPr lang="en-US" b="1" dirty="0" smtClean="0">
+            <a:rPr lang="en-US" b="1" dirty="0">
               <a:solidFill>
                 <a:schemeClr val="bg1"/>
               </a:solidFill>
             </a:rPr>
             <a:t>.NET Core 6.0 LTS</a:t>
           </a:r>
-          <a:endParaRPr lang="en-US" b="1" dirty="0">
-            <a:solidFill>
-              <a:schemeClr val="bg1"/>
-            </a:solidFill>
-          </a:endParaRPr>
         </a:p>
       </dgm:t>
     </dgm:pt>
@@ -3769,7 +3626,7 @@
         <a:lstStyle/>
         <a:p>
           <a:r>
-            <a:rPr lang="en-US" b="1" dirty="0" smtClean="0">
+            <a:rPr lang="en-US" b="1" dirty="0">
               <a:solidFill>
                 <a:schemeClr val="bg1"/>
               </a:solidFill>
@@ -3779,18 +3636,13 @@
         </a:p>
         <a:p>
           <a:r>
-            <a:rPr lang="en-US" b="1" dirty="0" smtClean="0">
+            <a:rPr lang="en-US" b="1" dirty="0">
               <a:solidFill>
                 <a:schemeClr val="bg1"/>
               </a:solidFill>
             </a:rPr>
             <a:t>.NET Core 7.0</a:t>
           </a:r>
-          <a:endParaRPr lang="en-US" b="1" dirty="0">
-            <a:solidFill>
-              <a:schemeClr val="bg1"/>
-            </a:solidFill>
-          </a:endParaRPr>
         </a:p>
       </dgm:t>
     </dgm:pt>
@@ -3840,7 +3692,7 @@
         <a:lstStyle/>
         <a:p>
           <a:r>
-            <a:rPr lang="en-US" b="1" dirty="0" smtClean="0">
+            <a:rPr lang="en-US" b="1" dirty="0">
               <a:solidFill>
                 <a:schemeClr val="bg1"/>
               </a:solidFill>
@@ -3850,18 +3702,13 @@
         </a:p>
         <a:p>
           <a:r>
-            <a:rPr lang="en-US" b="1" dirty="0" smtClean="0">
+            <a:rPr lang="en-US" b="1" dirty="0">
               <a:solidFill>
                 <a:schemeClr val="bg1"/>
               </a:solidFill>
             </a:rPr>
             <a:t>.NET Core 8.0 LTS</a:t>
           </a:r>
-          <a:endParaRPr lang="en-US" b="1" dirty="0">
-            <a:solidFill>
-              <a:schemeClr val="bg1"/>
-            </a:solidFill>
-          </a:endParaRPr>
         </a:p>
       </dgm:t>
     </dgm:pt>
@@ -3902,288 +3749,113 @@
         </dgm:presLayoutVars>
       </dgm:prSet>
       <dgm:spPr/>
-      <dgm:t>
-        <a:bodyPr/>
-        <a:lstStyle/>
-        <a:p>
-          <a:endParaRPr lang="en-US"/>
-        </a:p>
-      </dgm:t>
     </dgm:pt>
     <dgm:pt modelId="{EB299231-8E20-4B4F-B231-111AEA22D6F2}" type="pres">
       <dgm:prSet presAssocID="{35E7D8A3-FD26-46C9-A795-2B768B726360}" presName="parComposite" presStyleCnt="0"/>
       <dgm:spPr/>
-      <dgm:t>
-        <a:bodyPr/>
-        <a:lstStyle/>
-        <a:p>
-          <a:endParaRPr lang="en-US"/>
-        </a:p>
-      </dgm:t>
     </dgm:pt>
     <dgm:pt modelId="{897DB84A-8BFD-45E4-B73A-FC1627381808}" type="pres">
       <dgm:prSet presAssocID="{35E7D8A3-FD26-46C9-A795-2B768B726360}" presName="parBigCircle" presStyleLbl="node0" presStyleIdx="0" presStyleCnt="4"/>
       <dgm:spPr/>
-      <dgm:t>
-        <a:bodyPr/>
-        <a:lstStyle/>
-        <a:p>
-          <a:endParaRPr lang="en-US"/>
-        </a:p>
-      </dgm:t>
     </dgm:pt>
     <dgm:pt modelId="{52CB30BE-CBD1-4443-BCA8-12C528B4046A}" type="pres">
       <dgm:prSet presAssocID="{35E7D8A3-FD26-46C9-A795-2B768B726360}" presName="parTx" presStyleLbl="revTx" presStyleIdx="0" presStyleCnt="4"/>
       <dgm:spPr/>
-      <dgm:t>
-        <a:bodyPr/>
-        <a:lstStyle/>
-        <a:p>
-          <a:endParaRPr lang="en-US"/>
-        </a:p>
-      </dgm:t>
     </dgm:pt>
     <dgm:pt modelId="{AE1D01CC-15FB-4429-A161-0E621B580463}" type="pres">
       <dgm:prSet presAssocID="{35E7D8A3-FD26-46C9-A795-2B768B726360}" presName="bSpace" presStyleCnt="0"/>
       <dgm:spPr/>
-      <dgm:t>
-        <a:bodyPr/>
-        <a:lstStyle/>
-        <a:p>
-          <a:endParaRPr lang="en-US"/>
-        </a:p>
-      </dgm:t>
     </dgm:pt>
     <dgm:pt modelId="{CCE03D54-2EDB-448A-9F55-3F17E7CC520B}" type="pres">
       <dgm:prSet presAssocID="{35E7D8A3-FD26-46C9-A795-2B768B726360}" presName="parBackupNorm" presStyleCnt="0"/>
       <dgm:spPr/>
-      <dgm:t>
-        <a:bodyPr/>
-        <a:lstStyle/>
-        <a:p>
-          <a:endParaRPr lang="en-US"/>
-        </a:p>
-      </dgm:t>
     </dgm:pt>
     <dgm:pt modelId="{7F50BF51-2DB9-493F-929E-C4E851FBBC4B}" type="pres">
       <dgm:prSet presAssocID="{111A5CA4-8EDD-4090-8EE7-0636527F52C6}" presName="parSpace" presStyleCnt="0"/>
       <dgm:spPr/>
-      <dgm:t>
-        <a:bodyPr/>
-        <a:lstStyle/>
-        <a:p>
-          <a:endParaRPr lang="en-US"/>
-        </a:p>
-      </dgm:t>
     </dgm:pt>
     <dgm:pt modelId="{1A5CE4E6-D593-42F1-A794-3D4FB6B84C23}" type="pres">
       <dgm:prSet presAssocID="{3D27C287-AE48-4CFA-8A78-E34B272151E8}" presName="parComposite" presStyleCnt="0"/>
       <dgm:spPr/>
-      <dgm:t>
-        <a:bodyPr/>
-        <a:lstStyle/>
-        <a:p>
-          <a:endParaRPr lang="en-US"/>
-        </a:p>
-      </dgm:t>
     </dgm:pt>
     <dgm:pt modelId="{8F2F67F8-B6D2-449E-A178-1500297923D4}" type="pres">
       <dgm:prSet presAssocID="{3D27C287-AE48-4CFA-8A78-E34B272151E8}" presName="parBigCircle" presStyleLbl="node0" presStyleIdx="1" presStyleCnt="4"/>
       <dgm:spPr/>
-      <dgm:t>
-        <a:bodyPr/>
-        <a:lstStyle/>
-        <a:p>
-          <a:endParaRPr lang="en-US"/>
-        </a:p>
-      </dgm:t>
     </dgm:pt>
     <dgm:pt modelId="{E0505B84-7A18-456C-855B-76F97810A301}" type="pres">
       <dgm:prSet presAssocID="{3D27C287-AE48-4CFA-8A78-E34B272151E8}" presName="parTx" presStyleLbl="revTx" presStyleIdx="1" presStyleCnt="4"/>
       <dgm:spPr/>
-      <dgm:t>
-        <a:bodyPr/>
-        <a:lstStyle/>
-        <a:p>
-          <a:endParaRPr lang="en-US"/>
-        </a:p>
-      </dgm:t>
     </dgm:pt>
     <dgm:pt modelId="{1323EFE8-8EA8-4CA7-ACCC-3A804DE600EE}" type="pres">
       <dgm:prSet presAssocID="{3D27C287-AE48-4CFA-8A78-E34B272151E8}" presName="bSpace" presStyleCnt="0"/>
       <dgm:spPr/>
-      <dgm:t>
-        <a:bodyPr/>
-        <a:lstStyle/>
-        <a:p>
-          <a:endParaRPr lang="en-US"/>
-        </a:p>
-      </dgm:t>
     </dgm:pt>
     <dgm:pt modelId="{BACAF947-D890-495E-B6BC-04E94DA8D2A1}" type="pres">
       <dgm:prSet presAssocID="{3D27C287-AE48-4CFA-8A78-E34B272151E8}" presName="parBackupNorm" presStyleCnt="0"/>
       <dgm:spPr/>
-      <dgm:t>
-        <a:bodyPr/>
-        <a:lstStyle/>
-        <a:p>
-          <a:endParaRPr lang="en-US"/>
-        </a:p>
-      </dgm:t>
     </dgm:pt>
     <dgm:pt modelId="{79889EDA-BDEB-42FE-8815-2C2034467B14}" type="pres">
       <dgm:prSet presAssocID="{31766EA8-930E-46F9-83C8-8260C052A77D}" presName="parSpace" presStyleCnt="0"/>
       <dgm:spPr/>
-      <dgm:t>
-        <a:bodyPr/>
-        <a:lstStyle/>
-        <a:p>
-          <a:endParaRPr lang="en-US"/>
-        </a:p>
-      </dgm:t>
     </dgm:pt>
     <dgm:pt modelId="{A9FD6E3F-3D2E-470C-ADB5-26B524CBAED8}" type="pres">
       <dgm:prSet presAssocID="{42F22A7D-4657-4AD0-B04B-1B73164708A7}" presName="parComposite" presStyleCnt="0"/>
       <dgm:spPr/>
-      <dgm:t>
-        <a:bodyPr/>
-        <a:lstStyle/>
-        <a:p>
-          <a:endParaRPr lang="en-US"/>
-        </a:p>
-      </dgm:t>
     </dgm:pt>
     <dgm:pt modelId="{069BE6F3-E5CD-4D2C-85AE-F677980E8A96}" type="pres">
       <dgm:prSet presAssocID="{42F22A7D-4657-4AD0-B04B-1B73164708A7}" presName="parBigCircle" presStyleLbl="node0" presStyleIdx="2" presStyleCnt="4"/>
       <dgm:spPr/>
-      <dgm:t>
-        <a:bodyPr/>
-        <a:lstStyle/>
-        <a:p>
-          <a:endParaRPr lang="en-US"/>
-        </a:p>
-      </dgm:t>
     </dgm:pt>
     <dgm:pt modelId="{C9852EF8-BA52-4AD1-BABD-17B42D602B92}" type="pres">
       <dgm:prSet presAssocID="{42F22A7D-4657-4AD0-B04B-1B73164708A7}" presName="parTx" presStyleLbl="revTx" presStyleIdx="2" presStyleCnt="4"/>
       <dgm:spPr/>
-      <dgm:t>
-        <a:bodyPr/>
-        <a:lstStyle/>
-        <a:p>
-          <a:endParaRPr lang="en-US"/>
-        </a:p>
-      </dgm:t>
     </dgm:pt>
     <dgm:pt modelId="{B0CE36A7-6C12-47AE-842B-DC19BE8DC91A}" type="pres">
       <dgm:prSet presAssocID="{42F22A7D-4657-4AD0-B04B-1B73164708A7}" presName="bSpace" presStyleCnt="0"/>
       <dgm:spPr/>
-      <dgm:t>
-        <a:bodyPr/>
-        <a:lstStyle/>
-        <a:p>
-          <a:endParaRPr lang="en-US"/>
-        </a:p>
-      </dgm:t>
     </dgm:pt>
     <dgm:pt modelId="{22A60D4F-B24C-4BD0-8789-EF4EE009586B}" type="pres">
       <dgm:prSet presAssocID="{42F22A7D-4657-4AD0-B04B-1B73164708A7}" presName="parBackupNorm" presStyleCnt="0"/>
       <dgm:spPr/>
-      <dgm:t>
-        <a:bodyPr/>
-        <a:lstStyle/>
-        <a:p>
-          <a:endParaRPr lang="en-US"/>
-        </a:p>
-      </dgm:t>
     </dgm:pt>
     <dgm:pt modelId="{134178F2-327E-4552-996C-FB97AEDF14AC}" type="pres">
       <dgm:prSet presAssocID="{D086799A-A8C2-42D9-9F66-FD8C04880DEB}" presName="parSpace" presStyleCnt="0"/>
       <dgm:spPr/>
-      <dgm:t>
-        <a:bodyPr/>
-        <a:lstStyle/>
-        <a:p>
-          <a:endParaRPr lang="en-US"/>
-        </a:p>
-      </dgm:t>
     </dgm:pt>
     <dgm:pt modelId="{3A1F7D3C-B9B1-4EC4-83DD-C764216B4A72}" type="pres">
       <dgm:prSet presAssocID="{E3B166F3-4910-45EC-8133-553614141915}" presName="parComposite" presStyleCnt="0"/>
       <dgm:spPr/>
-      <dgm:t>
-        <a:bodyPr/>
-        <a:lstStyle/>
-        <a:p>
-          <a:endParaRPr lang="en-US"/>
-        </a:p>
-      </dgm:t>
     </dgm:pt>
     <dgm:pt modelId="{ECB6DE54-8DC4-4FBF-AB9B-399ADD7A5D3C}" type="pres">
       <dgm:prSet presAssocID="{E3B166F3-4910-45EC-8133-553614141915}" presName="parBigCircle" presStyleLbl="node0" presStyleIdx="3" presStyleCnt="4"/>
       <dgm:spPr/>
-      <dgm:t>
-        <a:bodyPr/>
-        <a:lstStyle/>
-        <a:p>
-          <a:endParaRPr lang="en-US"/>
-        </a:p>
-      </dgm:t>
     </dgm:pt>
     <dgm:pt modelId="{E9FDD7D0-D490-4498-B02F-F71A8DCB01CE}" type="pres">
       <dgm:prSet presAssocID="{E3B166F3-4910-45EC-8133-553614141915}" presName="parTx" presStyleLbl="revTx" presStyleIdx="3" presStyleCnt="4"/>
       <dgm:spPr/>
-      <dgm:t>
-        <a:bodyPr/>
-        <a:lstStyle/>
-        <a:p>
-          <a:endParaRPr lang="en-US"/>
-        </a:p>
-      </dgm:t>
     </dgm:pt>
     <dgm:pt modelId="{DB8215AB-D117-4655-9C40-2ED6CA1C6855}" type="pres">
       <dgm:prSet presAssocID="{E3B166F3-4910-45EC-8133-553614141915}" presName="bSpace" presStyleCnt="0"/>
       <dgm:spPr/>
-      <dgm:t>
-        <a:bodyPr/>
-        <a:lstStyle/>
-        <a:p>
-          <a:endParaRPr lang="en-US"/>
-        </a:p>
-      </dgm:t>
     </dgm:pt>
     <dgm:pt modelId="{0E1BF68D-D299-464F-9DD0-F438023E8CCB}" type="pres">
       <dgm:prSet presAssocID="{E3B166F3-4910-45EC-8133-553614141915}" presName="parBackupNorm" presStyleCnt="0"/>
       <dgm:spPr/>
-      <dgm:t>
-        <a:bodyPr/>
-        <a:lstStyle/>
-        <a:p>
-          <a:endParaRPr lang="en-US"/>
-        </a:p>
-      </dgm:t>
     </dgm:pt>
     <dgm:pt modelId="{9FB6671C-D947-4CCB-A146-50D53253A792}" type="pres">
       <dgm:prSet presAssocID="{8F398B8C-6E2A-41EB-A28D-E6593C35583E}" presName="parSpace" presStyleCnt="0"/>
       <dgm:spPr/>
-      <dgm:t>
-        <a:bodyPr/>
-        <a:lstStyle/>
-        <a:p>
-          <a:endParaRPr lang="en-US"/>
-        </a:p>
-      </dgm:t>
     </dgm:pt>
   </dgm:ptLst>
   <dgm:cxnLst>
+    <dgm:cxn modelId="{7E758506-D3A3-44AB-BF4D-3196A43E0E0E}" type="presOf" srcId="{3D27C287-AE48-4CFA-8A78-E34B272151E8}" destId="{E0505B84-7A18-456C-855B-76F97810A301}" srcOrd="0" destOrd="0" presId="urn:microsoft.com/office/officeart/2008/layout/CircleAccentTimeline"/>
+    <dgm:cxn modelId="{BD756939-4527-4506-B5CC-E299762DE5BB}" type="presOf" srcId="{7BE24B60-1C88-4F6D-A520-9537E11AF9F6}" destId="{B97B4845-A60C-46D9-9F67-2C5B063D546D}" srcOrd="0" destOrd="0" presId="urn:microsoft.com/office/officeart/2008/layout/CircleAccentTimeline"/>
+    <dgm:cxn modelId="{21FD3658-D46E-4D8C-971F-E4B72F28D164}" srcId="{7BE24B60-1C88-4F6D-A520-9537E11AF9F6}" destId="{E3B166F3-4910-45EC-8133-553614141915}" srcOrd="3" destOrd="0" parTransId="{C126F527-4A34-4A01-9EB2-5F42321008F5}" sibTransId="{8F398B8C-6E2A-41EB-A28D-E6593C35583E}"/>
+    <dgm:cxn modelId="{8A01499F-A438-493A-82D3-A250CCBA8BF4}" type="presOf" srcId="{35E7D8A3-FD26-46C9-A795-2B768B726360}" destId="{52CB30BE-CBD1-4443-BCA8-12C528B4046A}" srcOrd="0" destOrd="0" presId="urn:microsoft.com/office/officeart/2008/layout/CircleAccentTimeline"/>
     <dgm:cxn modelId="{4930F8C9-EDFD-45EB-AFEE-99FC52337005}" srcId="{7BE24B60-1C88-4F6D-A520-9537E11AF9F6}" destId="{35E7D8A3-FD26-46C9-A795-2B768B726360}" srcOrd="0" destOrd="0" parTransId="{E6659052-5707-4299-B3F5-799AD7EC16ED}" sibTransId="{111A5CA4-8EDD-4090-8EE7-0636527F52C6}"/>
-    <dgm:cxn modelId="{BD756939-4527-4506-B5CC-E299762DE5BB}" type="presOf" srcId="{7BE24B60-1C88-4F6D-A520-9537E11AF9F6}" destId="{B97B4845-A60C-46D9-9F67-2C5B063D546D}" srcOrd="0" destOrd="0" presId="urn:microsoft.com/office/officeart/2008/layout/CircleAccentTimeline"/>
+    <dgm:cxn modelId="{E8B917EB-8EF7-4A6C-A676-A8916A128204}" srcId="{7BE24B60-1C88-4F6D-A520-9537E11AF9F6}" destId="{42F22A7D-4657-4AD0-B04B-1B73164708A7}" srcOrd="2" destOrd="0" parTransId="{10F57535-B42F-4052-A452-5955D0B1CEE3}" sibTransId="{D086799A-A8C2-42D9-9F66-FD8C04880DEB}"/>
+    <dgm:cxn modelId="{94DB8CEB-04BB-4B2C-A831-8284AE73C8D3}" type="presOf" srcId="{42F22A7D-4657-4AD0-B04B-1B73164708A7}" destId="{C9852EF8-BA52-4AD1-BABD-17B42D602B92}" srcOrd="0" destOrd="0" presId="urn:microsoft.com/office/officeart/2008/layout/CircleAccentTimeline"/>
     <dgm:cxn modelId="{1C3549FC-C102-481B-B460-34DC53506D00}" srcId="{7BE24B60-1C88-4F6D-A520-9537E11AF9F6}" destId="{3D27C287-AE48-4CFA-8A78-E34B272151E8}" srcOrd="1" destOrd="0" parTransId="{8A719CDD-B601-4FD0-A023-88D46CCF6DCA}" sibTransId="{31766EA8-930E-46F9-83C8-8260C052A77D}"/>
-    <dgm:cxn modelId="{7E758506-D3A3-44AB-BF4D-3196A43E0E0E}" type="presOf" srcId="{3D27C287-AE48-4CFA-8A78-E34B272151E8}" destId="{E0505B84-7A18-456C-855B-76F97810A301}" srcOrd="0" destOrd="0" presId="urn:microsoft.com/office/officeart/2008/layout/CircleAccentTimeline"/>
-    <dgm:cxn modelId="{E8B917EB-8EF7-4A6C-A676-A8916A128204}" srcId="{7BE24B60-1C88-4F6D-A520-9537E11AF9F6}" destId="{42F22A7D-4657-4AD0-B04B-1B73164708A7}" srcOrd="2" destOrd="0" parTransId="{10F57535-B42F-4052-A452-5955D0B1CEE3}" sibTransId="{D086799A-A8C2-42D9-9F66-FD8C04880DEB}"/>
-    <dgm:cxn modelId="{8A01499F-A438-493A-82D3-A250CCBA8BF4}" type="presOf" srcId="{35E7D8A3-FD26-46C9-A795-2B768B726360}" destId="{52CB30BE-CBD1-4443-BCA8-12C528B4046A}" srcOrd="0" destOrd="0" presId="urn:microsoft.com/office/officeart/2008/layout/CircleAccentTimeline"/>
-    <dgm:cxn modelId="{94DB8CEB-04BB-4B2C-A831-8284AE73C8D3}" type="presOf" srcId="{42F22A7D-4657-4AD0-B04B-1B73164708A7}" destId="{C9852EF8-BA52-4AD1-BABD-17B42D602B92}" srcOrd="0" destOrd="0" presId="urn:microsoft.com/office/officeart/2008/layout/CircleAccentTimeline"/>
-    <dgm:cxn modelId="{21FD3658-D46E-4D8C-971F-E4B72F28D164}" srcId="{7BE24B60-1C88-4F6D-A520-9537E11AF9F6}" destId="{E3B166F3-4910-45EC-8133-553614141915}" srcOrd="3" destOrd="0" parTransId="{C126F527-4A34-4A01-9EB2-5F42321008F5}" sibTransId="{8F398B8C-6E2A-41EB-A28D-E6593C35583E}"/>
     <dgm:cxn modelId="{DD987FFC-9B3C-4E76-98BB-4034881DA4DA}" type="presOf" srcId="{E3B166F3-4910-45EC-8133-553614141915}" destId="{E9FDD7D0-D490-4498-B02F-F71A8DCB01CE}" srcOrd="0" destOrd="0" presId="urn:microsoft.com/office/officeart/2008/layout/CircleAccentTimeline"/>
     <dgm:cxn modelId="{EDEC01EE-AA7F-442A-8E39-10796D92CA55}" type="presParOf" srcId="{B97B4845-A60C-46D9-9F67-2C5B063D546D}" destId="{EB299231-8E20-4B4F-B231-111AEA22D6F2}" srcOrd="0" destOrd="0" presId="urn:microsoft.com/office/officeart/2008/layout/CircleAccentTimeline"/>
     <dgm:cxn modelId="{5343CAC4-6340-4058-A044-F0206B055824}" type="presParOf" srcId="{EB299231-8E20-4B4F-B231-111AEA22D6F2}" destId="{897DB84A-8BFD-45E4-B73A-FC1627381808}" srcOrd="0" destOrd="0" presId="urn:microsoft.com/office/officeart/2008/layout/CircleAccentTimeline"/>
@@ -4291,7 +3963,7 @@
         </a:bodyPr>
         <a:lstStyle/>
         <a:p>
-          <a:pPr lvl="0" algn="ctr" defTabSz="933450">
+          <a:pPr marL="0" lvl="0" indent="0" algn="ctr" defTabSz="933450">
             <a:lnSpc>
               <a:spcPct val="90000"/>
             </a:lnSpc>
@@ -4301,6 +3973,7 @@
             <a:spcAft>
               <a:spcPct val="35000"/>
             </a:spcAft>
+            <a:buNone/>
           </a:pPr>
           <a:r>
             <a:rPr lang="en-US" sz="2100" kern="1200" dirty="0"/>
@@ -4368,7 +4041,7 @@
         </a:bodyPr>
         <a:lstStyle/>
         <a:p>
-          <a:pPr lvl="0" algn="ctr" defTabSz="933450">
+          <a:pPr marL="0" lvl="0" indent="0" algn="ctr" defTabSz="933450">
             <a:lnSpc>
               <a:spcPct val="90000"/>
             </a:lnSpc>
@@ -4378,6 +4051,7 @@
             <a:spcAft>
               <a:spcPct val="35000"/>
             </a:spcAft>
+            <a:buNone/>
           </a:pPr>
           <a:r>
             <a:rPr lang="en-US" sz="2100" kern="1200" dirty="0"/>
@@ -4445,7 +4119,7 @@
         </a:bodyPr>
         <a:lstStyle/>
         <a:p>
-          <a:pPr lvl="0" algn="ctr" defTabSz="933450">
+          <a:pPr marL="0" lvl="0" indent="0" algn="ctr" defTabSz="933450">
             <a:lnSpc>
               <a:spcPct val="90000"/>
             </a:lnSpc>
@@ -4455,6 +4129,7 @@
             <a:spcAft>
               <a:spcPct val="35000"/>
             </a:spcAft>
+            <a:buNone/>
           </a:pPr>
           <a:r>
             <a:rPr lang="en-US" sz="2100" kern="1200" dirty="0"/>
@@ -4522,7 +4197,7 @@
         </a:bodyPr>
         <a:lstStyle/>
         <a:p>
-          <a:pPr lvl="0" algn="ctr" defTabSz="933450">
+          <a:pPr marL="0" lvl="0" indent="0" algn="ctr" defTabSz="933450">
             <a:lnSpc>
               <a:spcPct val="90000"/>
             </a:lnSpc>
@@ -4532,6 +4207,7 @@
             <a:spcAft>
               <a:spcPct val="35000"/>
             </a:spcAft>
+            <a:buNone/>
           </a:pPr>
           <a:r>
             <a:rPr lang="en-US" sz="2100" kern="1200" dirty="0"/>
@@ -4599,7 +4275,7 @@
         </a:bodyPr>
         <a:lstStyle/>
         <a:p>
-          <a:pPr lvl="0" algn="ctr" defTabSz="933450">
+          <a:pPr marL="0" lvl="0" indent="0" algn="ctr" defTabSz="933450">
             <a:lnSpc>
               <a:spcPct val="90000"/>
             </a:lnSpc>
@@ -4609,6 +4285,7 @@
             <a:spcAft>
               <a:spcPct val="35000"/>
             </a:spcAft>
+            <a:buNone/>
           </a:pPr>
           <a:r>
             <a:rPr lang="en-US" sz="2100" kern="1200" dirty="0"/>
@@ -4676,7 +4353,7 @@
         </a:bodyPr>
         <a:lstStyle/>
         <a:p>
-          <a:pPr lvl="0" algn="ctr" defTabSz="933450">
+          <a:pPr marL="0" lvl="0" indent="0" algn="ctr" defTabSz="933450">
             <a:lnSpc>
               <a:spcPct val="90000"/>
             </a:lnSpc>
@@ -4686,6 +4363,7 @@
             <a:spcAft>
               <a:spcPct val="35000"/>
             </a:spcAft>
+            <a:buNone/>
           </a:pPr>
           <a:r>
             <a:rPr lang="en-US" sz="2100" kern="1200" dirty="0"/>
@@ -4753,7 +4431,7 @@
         </a:bodyPr>
         <a:lstStyle/>
         <a:p>
-          <a:pPr lvl="0" algn="ctr" defTabSz="933450">
+          <a:pPr marL="0" lvl="0" indent="0" algn="ctr" defTabSz="933450">
             <a:lnSpc>
               <a:spcPct val="90000"/>
             </a:lnSpc>
@@ -4763,6 +4441,7 @@
             <a:spcAft>
               <a:spcPct val="35000"/>
             </a:spcAft>
+            <a:buNone/>
           </a:pPr>
           <a:r>
             <a:rPr lang="en-US" sz="2100" kern="1200" dirty="0"/>
@@ -4830,7 +4509,7 @@
         </a:bodyPr>
         <a:lstStyle/>
         <a:p>
-          <a:pPr lvl="0" algn="ctr" defTabSz="933450">
+          <a:pPr marL="0" lvl="0" indent="0" algn="ctr" defTabSz="933450">
             <a:lnSpc>
               <a:spcPct val="90000"/>
             </a:lnSpc>
@@ -4840,6 +4519,7 @@
             <a:spcAft>
               <a:spcPct val="35000"/>
             </a:spcAft>
+            <a:buNone/>
           </a:pPr>
           <a:r>
             <a:rPr lang="en-US" sz="2100" kern="1200" dirty="0"/>
@@ -4907,7 +4587,7 @@
         </a:bodyPr>
         <a:lstStyle/>
         <a:p>
-          <a:pPr lvl="0" algn="ctr" defTabSz="933450">
+          <a:pPr marL="0" lvl="0" indent="0" algn="ctr" defTabSz="933450">
             <a:lnSpc>
               <a:spcPct val="90000"/>
             </a:lnSpc>
@@ -4917,6 +4597,7 @@
             <a:spcAft>
               <a:spcPct val="35000"/>
             </a:spcAft>
+            <a:buNone/>
           </a:pPr>
           <a:r>
             <a:rPr lang="en-US" sz="2100" kern="1200" dirty="0"/>
@@ -4984,7 +4665,7 @@
         </a:bodyPr>
         <a:lstStyle/>
         <a:p>
-          <a:pPr lvl="0" algn="ctr" defTabSz="933450">
+          <a:pPr marL="0" lvl="0" indent="0" algn="ctr" defTabSz="933450">
             <a:lnSpc>
               <a:spcPct val="90000"/>
             </a:lnSpc>
@@ -4994,6 +4675,7 @@
             <a:spcAft>
               <a:spcPct val="35000"/>
             </a:spcAft>
+            <a:buNone/>
           </a:pPr>
           <a:r>
             <a:rPr lang="en-US" sz="2100" kern="1200" dirty="0"/>
@@ -5061,7 +4743,7 @@
         </a:bodyPr>
         <a:lstStyle/>
         <a:p>
-          <a:pPr lvl="0" algn="ctr" defTabSz="933450">
+          <a:pPr marL="0" lvl="0" indent="0" algn="ctr" defTabSz="933450">
             <a:lnSpc>
               <a:spcPct val="90000"/>
             </a:lnSpc>
@@ -5071,6 +4753,7 @@
             <a:spcAft>
               <a:spcPct val="35000"/>
             </a:spcAft>
+            <a:buNone/>
           </a:pPr>
           <a:r>
             <a:rPr lang="en-US" sz="2100" kern="1200" dirty="0"/>
@@ -5138,7 +4821,7 @@
         </a:bodyPr>
         <a:lstStyle/>
         <a:p>
-          <a:pPr lvl="0" algn="ctr" defTabSz="933450">
+          <a:pPr marL="0" lvl="0" indent="0" algn="ctr" defTabSz="933450">
             <a:lnSpc>
               <a:spcPct val="90000"/>
             </a:lnSpc>
@@ -5148,6 +4831,7 @@
             <a:spcAft>
               <a:spcPct val="35000"/>
             </a:spcAft>
+            <a:buNone/>
           </a:pPr>
           <a:r>
             <a:rPr lang="en-US" sz="2100" kern="1200" dirty="0"/>
@@ -5227,7 +4911,7 @@
         </a:bodyPr>
         <a:lstStyle/>
         <a:p>
-          <a:pPr lvl="0" algn="ctr" defTabSz="1555750">
+          <a:pPr marL="0" lvl="0" indent="0" algn="ctr" defTabSz="1555750">
             <a:lnSpc>
               <a:spcPct val="90000"/>
             </a:lnSpc>
@@ -5237,6 +4921,7 @@
             <a:spcAft>
               <a:spcPct val="35000"/>
             </a:spcAft>
+            <a:buNone/>
           </a:pPr>
           <a:r>
             <a:rPr lang="en-US" sz="3500" kern="1200" dirty="0"/>
@@ -5304,7 +4989,7 @@
         </a:bodyPr>
         <a:lstStyle/>
         <a:p>
-          <a:pPr lvl="0" algn="ctr" defTabSz="1555750">
+          <a:pPr marL="0" lvl="0" indent="0" algn="ctr" defTabSz="1555750">
             <a:lnSpc>
               <a:spcPct val="90000"/>
             </a:lnSpc>
@@ -5314,6 +4999,7 @@
             <a:spcAft>
               <a:spcPct val="35000"/>
             </a:spcAft>
+            <a:buNone/>
           </a:pPr>
           <a:r>
             <a:rPr lang="en-US" sz="3500" kern="1200" dirty="0"/>
@@ -5381,7 +5067,7 @@
         </a:bodyPr>
         <a:lstStyle/>
         <a:p>
-          <a:pPr lvl="0" algn="ctr" defTabSz="1555750">
+          <a:pPr marL="0" lvl="0" indent="0" algn="ctr" defTabSz="1555750">
             <a:lnSpc>
               <a:spcPct val="90000"/>
             </a:lnSpc>
@@ -5391,6 +5077,7 @@
             <a:spcAft>
               <a:spcPct val="35000"/>
             </a:spcAft>
+            <a:buNone/>
           </a:pPr>
           <a:r>
             <a:rPr lang="en-US" sz="3500" kern="1200" dirty="0"/>
@@ -5458,7 +5145,7 @@
         </a:bodyPr>
         <a:lstStyle/>
         <a:p>
-          <a:pPr lvl="0" algn="ctr" defTabSz="1555750">
+          <a:pPr marL="0" lvl="0" indent="0" algn="ctr" defTabSz="1555750">
             <a:lnSpc>
               <a:spcPct val="90000"/>
             </a:lnSpc>
@@ -5468,6 +5155,7 @@
             <a:spcAft>
               <a:spcPct val="35000"/>
             </a:spcAft>
+            <a:buNone/>
           </a:pPr>
           <a:r>
             <a:rPr lang="en-US" sz="3500" kern="1200" dirty="0"/>
@@ -5535,7 +5223,7 @@
         </a:bodyPr>
         <a:lstStyle/>
         <a:p>
-          <a:pPr lvl="0" algn="ctr" defTabSz="1555750">
+          <a:pPr marL="0" lvl="0" indent="0" algn="ctr" defTabSz="1555750">
             <a:lnSpc>
               <a:spcPct val="90000"/>
             </a:lnSpc>
@@ -5545,6 +5233,7 @@
             <a:spcAft>
               <a:spcPct val="35000"/>
             </a:spcAft>
+            <a:buNone/>
           </a:pPr>
           <a:r>
             <a:rPr lang="en-US" sz="3500" kern="1200" dirty="0"/>
@@ -5612,7 +5301,7 @@
         </a:bodyPr>
         <a:lstStyle/>
         <a:p>
-          <a:pPr lvl="0" algn="ctr" defTabSz="1555750">
+          <a:pPr marL="0" lvl="0" indent="0" algn="ctr" defTabSz="1555750">
             <a:lnSpc>
               <a:spcPct val="90000"/>
             </a:lnSpc>
@@ -5622,6 +5311,7 @@
             <a:spcAft>
               <a:spcPct val="35000"/>
             </a:spcAft>
+            <a:buNone/>
           </a:pPr>
           <a:r>
             <a:rPr lang="en-US" sz="3500" kern="1200" dirty="0"/>
@@ -5689,7 +5379,7 @@
         </a:bodyPr>
         <a:lstStyle/>
         <a:p>
-          <a:pPr lvl="0" algn="ctr" defTabSz="1555750">
+          <a:pPr marL="0" lvl="0" indent="0" algn="ctr" defTabSz="1555750">
             <a:lnSpc>
               <a:spcPct val="90000"/>
             </a:lnSpc>
@@ -5699,6 +5389,7 @@
             <a:spcAft>
               <a:spcPct val="35000"/>
             </a:spcAft>
+            <a:buNone/>
           </a:pPr>
           <a:r>
             <a:rPr lang="en-US" sz="3500" kern="1200" dirty="0"/>
@@ -5846,7 +5537,7 @@
         </a:bodyPr>
         <a:lstStyle/>
         <a:p>
-          <a:pPr lvl="0" algn="l" defTabSz="889000">
+          <a:pPr marL="0" lvl="0" indent="0" algn="l" defTabSz="889000">
             <a:lnSpc>
               <a:spcPct val="90000"/>
             </a:lnSpc>
@@ -5856,20 +5547,16 @@
             <a:spcAft>
               <a:spcPct val="35000"/>
             </a:spcAft>
+            <a:buNone/>
           </a:pPr>
           <a:r>
-            <a:rPr lang="en-US" sz="2000" b="1" kern="1200" dirty="0" smtClean="0">
+            <a:rPr lang="en-US" sz="2000" b="1" kern="1200" dirty="0">
               <a:solidFill>
                 <a:schemeClr val="bg1"/>
               </a:solidFill>
             </a:rPr>
             <a:t>11/2020 .NET Core 5.0</a:t>
           </a:r>
-          <a:endParaRPr lang="en-US" sz="2000" b="1" kern="1200" dirty="0">
-            <a:solidFill>
-              <a:schemeClr val="bg1"/>
-            </a:solidFill>
-          </a:endParaRPr>
         </a:p>
       </dsp:txBody>
       <dsp:txXfrm>
@@ -6000,7 +5687,7 @@
         </a:bodyPr>
         <a:lstStyle/>
         <a:p>
-          <a:pPr lvl="0" algn="l" defTabSz="889000">
+          <a:pPr marL="0" lvl="0" indent="0" algn="l" defTabSz="889000">
             <a:lnSpc>
               <a:spcPct val="90000"/>
             </a:lnSpc>
@@ -6010,9 +5697,10 @@
             <a:spcAft>
               <a:spcPct val="35000"/>
             </a:spcAft>
+            <a:buNone/>
           </a:pPr>
           <a:r>
-            <a:rPr lang="en-US" sz="2000" b="1" kern="1200" dirty="0" smtClean="0">
+            <a:rPr lang="en-US" sz="2000" b="1" kern="1200" dirty="0">
               <a:solidFill>
                 <a:schemeClr val="bg1"/>
               </a:solidFill>
@@ -6021,7 +5709,7 @@
           </a:r>
         </a:p>
         <a:p>
-          <a:pPr lvl="0" algn="l" defTabSz="889000">
+          <a:pPr marL="0" lvl="0" indent="0" algn="l" defTabSz="889000">
             <a:lnSpc>
               <a:spcPct val="90000"/>
             </a:lnSpc>
@@ -6031,20 +5719,16 @@
             <a:spcAft>
               <a:spcPct val="35000"/>
             </a:spcAft>
+            <a:buNone/>
           </a:pPr>
           <a:r>
-            <a:rPr lang="en-US" sz="2000" b="1" kern="1200" dirty="0" smtClean="0">
+            <a:rPr lang="en-US" sz="2000" b="1" kern="1200" dirty="0">
               <a:solidFill>
                 <a:schemeClr val="bg1"/>
               </a:solidFill>
             </a:rPr>
             <a:t>.NET Core 6.0 LTS</a:t>
           </a:r>
-          <a:endParaRPr lang="en-US" sz="2000" b="1" kern="1200" dirty="0">
-            <a:solidFill>
-              <a:schemeClr val="bg1"/>
-            </a:solidFill>
-          </a:endParaRPr>
         </a:p>
       </dsp:txBody>
       <dsp:txXfrm>
@@ -6175,7 +5859,7 @@
         </a:bodyPr>
         <a:lstStyle/>
         <a:p>
-          <a:pPr lvl="0" algn="l" defTabSz="889000">
+          <a:pPr marL="0" lvl="0" indent="0" algn="l" defTabSz="889000">
             <a:lnSpc>
               <a:spcPct val="90000"/>
             </a:lnSpc>
@@ -6185,9 +5869,10 @@
             <a:spcAft>
               <a:spcPct val="35000"/>
             </a:spcAft>
+            <a:buNone/>
           </a:pPr>
           <a:r>
-            <a:rPr lang="en-US" sz="2000" b="1" kern="1200" dirty="0" smtClean="0">
+            <a:rPr lang="en-US" sz="2000" b="1" kern="1200" dirty="0">
               <a:solidFill>
                 <a:schemeClr val="bg1"/>
               </a:solidFill>
@@ -6196,7 +5881,7 @@
           </a:r>
         </a:p>
         <a:p>
-          <a:pPr lvl="0" algn="l" defTabSz="889000">
+          <a:pPr marL="0" lvl="0" indent="0" algn="l" defTabSz="889000">
             <a:lnSpc>
               <a:spcPct val="90000"/>
             </a:lnSpc>
@@ -6206,20 +5891,16 @@
             <a:spcAft>
               <a:spcPct val="35000"/>
             </a:spcAft>
+            <a:buNone/>
           </a:pPr>
           <a:r>
-            <a:rPr lang="en-US" sz="2000" b="1" kern="1200" dirty="0" smtClean="0">
+            <a:rPr lang="en-US" sz="2000" b="1" kern="1200" dirty="0">
               <a:solidFill>
                 <a:schemeClr val="bg1"/>
               </a:solidFill>
             </a:rPr>
             <a:t>.NET Core 7.0</a:t>
           </a:r>
-          <a:endParaRPr lang="en-US" sz="2000" b="1" kern="1200" dirty="0">
-            <a:solidFill>
-              <a:schemeClr val="bg1"/>
-            </a:solidFill>
-          </a:endParaRPr>
         </a:p>
       </dsp:txBody>
       <dsp:txXfrm>
@@ -6350,7 +6031,7 @@
         </a:bodyPr>
         <a:lstStyle/>
         <a:p>
-          <a:pPr lvl="0" algn="l" defTabSz="889000">
+          <a:pPr marL="0" lvl="0" indent="0" algn="l" defTabSz="889000">
             <a:lnSpc>
               <a:spcPct val="90000"/>
             </a:lnSpc>
@@ -6360,9 +6041,10 @@
             <a:spcAft>
               <a:spcPct val="35000"/>
             </a:spcAft>
+            <a:buNone/>
           </a:pPr>
           <a:r>
-            <a:rPr lang="en-US" sz="2000" b="1" kern="1200" dirty="0" smtClean="0">
+            <a:rPr lang="en-US" sz="2000" b="1" kern="1200" dirty="0">
               <a:solidFill>
                 <a:schemeClr val="bg1"/>
               </a:solidFill>
@@ -6371,7 +6053,7 @@
           </a:r>
         </a:p>
         <a:p>
-          <a:pPr lvl="0" algn="l" defTabSz="889000">
+          <a:pPr marL="0" lvl="0" indent="0" algn="l" defTabSz="889000">
             <a:lnSpc>
               <a:spcPct val="90000"/>
             </a:lnSpc>
@@ -6381,20 +6063,16 @@
             <a:spcAft>
               <a:spcPct val="35000"/>
             </a:spcAft>
+            <a:buNone/>
           </a:pPr>
           <a:r>
-            <a:rPr lang="en-US" sz="2000" b="1" kern="1200" dirty="0" smtClean="0">
+            <a:rPr lang="en-US" sz="2000" b="1" kern="1200" dirty="0">
               <a:solidFill>
                 <a:schemeClr val="bg1"/>
               </a:solidFill>
             </a:rPr>
             <a:t>.NET Core 8.0 LTS</a:t>
           </a:r>
-          <a:endParaRPr lang="en-US" sz="2000" b="1" kern="1200" dirty="0">
-            <a:solidFill>
-              <a:schemeClr val="bg1"/>
-            </a:solidFill>
-          </a:endParaRPr>
         </a:p>
       </dsp:txBody>
       <dsp:txXfrm>
@@ -10742,7 +10420,7 @@
           <a:p>
             <a:fld id="{B92AF19A-3A5D-4544-B608-275F196904EE}" type="datetimeFigureOut">
               <a:rPr lang="fi-FI" smtClean="0"/>
-              <a:t>3.3.2020</a:t>
+              <a:t>4.3.2020</a:t>
             </a:fld>
             <a:endParaRPr lang="fi-FI"/>
           </a:p>
@@ -10796,7 +10474,7 @@
           <a:p>
             <a:fld id="{2FDC2449-95AC-459F-A23E-20B822D35C3B}" type="slidenum">
               <a:rPr lang="fi-FI" smtClean="0"/>
-              <a:t>‹#›</a:t>
+              <a:t>‹nr.›</a:t>
             </a:fld>
             <a:endParaRPr lang="fi-FI"/>
           </a:p>
@@ -10940,7 +10618,7 @@
           <a:p>
             <a:fld id="{B92AF19A-3A5D-4544-B608-275F196904EE}" type="datetimeFigureOut">
               <a:rPr lang="fi-FI" smtClean="0"/>
-              <a:t>3.3.2020</a:t>
+              <a:t>4.3.2020</a:t>
             </a:fld>
             <a:endParaRPr lang="fi-FI"/>
           </a:p>
@@ -10994,7 +10672,7 @@
           <a:p>
             <a:fld id="{2FDC2449-95AC-459F-A23E-20B822D35C3B}" type="slidenum">
               <a:rPr lang="fi-FI" smtClean="0"/>
-              <a:t>‹#›</a:t>
+              <a:t>‹nr.›</a:t>
             </a:fld>
             <a:endParaRPr lang="fi-FI"/>
           </a:p>
@@ -11148,7 +10826,7 @@
           <a:p>
             <a:fld id="{B92AF19A-3A5D-4544-B608-275F196904EE}" type="datetimeFigureOut">
               <a:rPr lang="fi-FI" smtClean="0"/>
-              <a:t>3.3.2020</a:t>
+              <a:t>4.3.2020</a:t>
             </a:fld>
             <a:endParaRPr lang="fi-FI"/>
           </a:p>
@@ -11202,7 +10880,7 @@
           <a:p>
             <a:fld id="{2FDC2449-95AC-459F-A23E-20B822D35C3B}" type="slidenum">
               <a:rPr lang="fi-FI" smtClean="0"/>
-              <a:t>‹#›</a:t>
+              <a:t>‹nr.›</a:t>
             </a:fld>
             <a:endParaRPr lang="fi-FI"/>
           </a:p>
@@ -11384,7 +11062,7 @@
           <a:p>
             <a:fld id="{E775D14A-821B-4B49-96E5-E9F4BE48D633}" type="datetimeFigureOut">
               <a:rPr lang="fi-FI" smtClean="0"/>
-              <a:t>3.3.2020</a:t>
+              <a:t>4.3.2020</a:t>
             </a:fld>
             <a:endParaRPr lang="fi-FI"/>
           </a:p>
@@ -11454,7 +11132,7 @@
           <a:p>
             <a:fld id="{8B530987-778B-43A2-9301-DDB7EE204570}" type="slidenum">
               <a:rPr lang="fi-FI" smtClean="0"/>
-              <a:t>‹#›</a:t>
+              <a:t>‹nr.›</a:t>
             </a:fld>
             <a:endParaRPr lang="fi-FI"/>
           </a:p>
@@ -11624,7 +11302,7 @@
           <a:p>
             <a:fld id="{E775D14A-821B-4B49-96E5-E9F4BE48D633}" type="datetimeFigureOut">
               <a:rPr lang="fi-FI" smtClean="0"/>
-              <a:t>3.3.2020</a:t>
+              <a:t>4.3.2020</a:t>
             </a:fld>
             <a:endParaRPr lang="fi-FI"/>
           </a:p>
@@ -11694,7 +11372,7 @@
           <a:p>
             <a:fld id="{8B530987-778B-43A2-9301-DDB7EE204570}" type="slidenum">
               <a:rPr lang="fi-FI" smtClean="0"/>
-              <a:t>‹#›</a:t>
+              <a:t>‹nr.›</a:t>
             </a:fld>
             <a:endParaRPr lang="fi-FI"/>
           </a:p>
@@ -11930,7 +11608,7 @@
           <a:p>
             <a:fld id="{E775D14A-821B-4B49-96E5-E9F4BE48D633}" type="datetimeFigureOut">
               <a:rPr lang="fi-FI" smtClean="0"/>
-              <a:t>3.3.2020</a:t>
+              <a:t>4.3.2020</a:t>
             </a:fld>
             <a:endParaRPr lang="fi-FI"/>
           </a:p>
@@ -12000,7 +11678,7 @@
           <a:p>
             <a:fld id="{8B530987-778B-43A2-9301-DDB7EE204570}" type="slidenum">
               <a:rPr lang="fi-FI" smtClean="0"/>
-              <a:t>‹#›</a:t>
+              <a:t>‹nr.›</a:t>
             </a:fld>
             <a:endParaRPr lang="fi-FI"/>
           </a:p>
@@ -12236,7 +11914,7 @@
           <a:p>
             <a:fld id="{E775D14A-821B-4B49-96E5-E9F4BE48D633}" type="datetimeFigureOut">
               <a:rPr lang="fi-FI" smtClean="0"/>
-              <a:t>3.3.2020</a:t>
+              <a:t>4.3.2020</a:t>
             </a:fld>
             <a:endParaRPr lang="fi-FI"/>
           </a:p>
@@ -12306,7 +11984,7 @@
           <a:p>
             <a:fld id="{8B530987-778B-43A2-9301-DDB7EE204570}" type="slidenum">
               <a:rPr lang="fi-FI" smtClean="0"/>
-              <a:t>‹#›</a:t>
+              <a:t>‹nr.›</a:t>
             </a:fld>
             <a:endParaRPr lang="fi-FI"/>
           </a:p>
@@ -12690,7 +12368,7 @@
           <a:p>
             <a:fld id="{E775D14A-821B-4B49-96E5-E9F4BE48D633}" type="datetimeFigureOut">
               <a:rPr lang="fi-FI" smtClean="0"/>
-              <a:t>3.3.2020</a:t>
+              <a:t>4.3.2020</a:t>
             </a:fld>
             <a:endParaRPr lang="fi-FI"/>
           </a:p>
@@ -12760,7 +12438,7 @@
           <a:p>
             <a:fld id="{8B530987-778B-43A2-9301-DDB7EE204570}" type="slidenum">
               <a:rPr lang="fi-FI" smtClean="0"/>
-              <a:t>‹#›</a:t>
+              <a:t>‹nr.›</a:t>
             </a:fld>
             <a:endParaRPr lang="fi-FI"/>
           </a:p>
@@ -12864,7 +12542,7 @@
           <a:p>
             <a:fld id="{E775D14A-821B-4B49-96E5-E9F4BE48D633}" type="datetimeFigureOut">
               <a:rPr lang="fi-FI" smtClean="0"/>
-              <a:t>3.3.2020</a:t>
+              <a:t>4.3.2020</a:t>
             </a:fld>
             <a:endParaRPr lang="fi-FI"/>
           </a:p>
@@ -12934,7 +12612,7 @@
           <a:p>
             <a:fld id="{8B530987-778B-43A2-9301-DDB7EE204570}" type="slidenum">
               <a:rPr lang="fi-FI" smtClean="0"/>
-              <a:t>‹#›</a:t>
+              <a:t>‹nr.›</a:t>
             </a:fld>
             <a:endParaRPr lang="fi-FI"/>
           </a:p>
@@ -13001,7 +12679,7 @@
           <a:p>
             <a:fld id="{E775D14A-821B-4B49-96E5-E9F4BE48D633}" type="datetimeFigureOut">
               <a:rPr lang="fi-FI" smtClean="0"/>
-              <a:t>3.3.2020</a:t>
+              <a:t>4.3.2020</a:t>
             </a:fld>
             <a:endParaRPr lang="fi-FI"/>
           </a:p>
@@ -13071,7 +12749,7 @@
           <a:p>
             <a:fld id="{8B530987-778B-43A2-9301-DDB7EE204570}" type="slidenum">
               <a:rPr lang="fi-FI" smtClean="0"/>
-              <a:t>‹#›</a:t>
+              <a:t>‹nr.›</a:t>
             </a:fld>
             <a:endParaRPr lang="fi-FI"/>
           </a:p>
@@ -13347,7 +13025,7 @@
           <a:p>
             <a:fld id="{E775D14A-821B-4B49-96E5-E9F4BE48D633}" type="datetimeFigureOut">
               <a:rPr lang="fi-FI" smtClean="0"/>
-              <a:t>3.3.2020</a:t>
+              <a:t>4.3.2020</a:t>
             </a:fld>
             <a:endParaRPr lang="fi-FI"/>
           </a:p>
@@ -13417,7 +13095,7 @@
           <a:p>
             <a:fld id="{8B530987-778B-43A2-9301-DDB7EE204570}" type="slidenum">
               <a:rPr lang="fi-FI" smtClean="0"/>
-              <a:t>‹#›</a:t>
+              <a:t>‹nr.›</a:t>
             </a:fld>
             <a:endParaRPr lang="fi-FI"/>
           </a:p>
@@ -13561,7 +13239,7 @@
           <a:p>
             <a:fld id="{B92AF19A-3A5D-4544-B608-275F196904EE}" type="datetimeFigureOut">
               <a:rPr lang="fi-FI" smtClean="0"/>
-              <a:t>3.3.2020</a:t>
+              <a:t>4.3.2020</a:t>
             </a:fld>
             <a:endParaRPr lang="fi-FI"/>
           </a:p>
@@ -13615,7 +13293,7 @@
           <a:p>
             <a:fld id="{2FDC2449-95AC-459F-A23E-20B822D35C3B}" type="slidenum">
               <a:rPr lang="fi-FI" smtClean="0"/>
-              <a:t>‹#›</a:t>
+              <a:t>‹nr.›</a:t>
             </a:fld>
             <a:endParaRPr lang="fi-FI"/>
           </a:p>
@@ -13867,7 +13545,7 @@
           <a:p>
             <a:fld id="{E775D14A-821B-4B49-96E5-E9F4BE48D633}" type="datetimeFigureOut">
               <a:rPr lang="fi-FI" smtClean="0"/>
-              <a:t>3.3.2020</a:t>
+              <a:t>4.3.2020</a:t>
             </a:fld>
             <a:endParaRPr lang="fi-FI"/>
           </a:p>
@@ -13937,7 +13615,7 @@
           <a:p>
             <a:fld id="{8B530987-778B-43A2-9301-DDB7EE204570}" type="slidenum">
               <a:rPr lang="fi-FI" smtClean="0"/>
-              <a:t>‹#›</a:t>
+              <a:t>‹nr.›</a:t>
             </a:fld>
             <a:endParaRPr lang="fi-FI"/>
           </a:p>
@@ -14107,7 +13785,7 @@
           <a:p>
             <a:fld id="{E775D14A-821B-4B49-96E5-E9F4BE48D633}" type="datetimeFigureOut">
               <a:rPr lang="fi-FI" smtClean="0"/>
-              <a:t>3.3.2020</a:t>
+              <a:t>4.3.2020</a:t>
             </a:fld>
             <a:endParaRPr lang="fi-FI"/>
           </a:p>
@@ -14177,7 +13855,7 @@
           <a:p>
             <a:fld id="{8B530987-778B-43A2-9301-DDB7EE204570}" type="slidenum">
               <a:rPr lang="fi-FI" smtClean="0"/>
-              <a:t>‹#›</a:t>
+              <a:t>‹nr.›</a:t>
             </a:fld>
             <a:endParaRPr lang="fi-FI"/>
           </a:p>
@@ -14347,7 +14025,7 @@
           <a:p>
             <a:fld id="{E775D14A-821B-4B49-96E5-E9F4BE48D633}" type="datetimeFigureOut">
               <a:rPr lang="fi-FI" smtClean="0"/>
-              <a:t>3.3.2020</a:t>
+              <a:t>4.3.2020</a:t>
             </a:fld>
             <a:endParaRPr lang="fi-FI"/>
           </a:p>
@@ -14417,7 +14095,7 @@
           <a:p>
             <a:fld id="{8B530987-778B-43A2-9301-DDB7EE204570}" type="slidenum">
               <a:rPr lang="fi-FI" smtClean="0"/>
-              <a:t>‹#›</a:t>
+              <a:t>‹nr.›</a:t>
             </a:fld>
             <a:endParaRPr lang="fi-FI"/>
           </a:p>
@@ -14638,7 +14316,7 @@
           <a:p>
             <a:fld id="{B92AF19A-3A5D-4544-B608-275F196904EE}" type="datetimeFigureOut">
               <a:rPr lang="fi-FI" smtClean="0"/>
-              <a:t>3.3.2020</a:t>
+              <a:t>4.3.2020</a:t>
             </a:fld>
             <a:endParaRPr lang="fi-FI"/>
           </a:p>
@@ -14692,7 +14370,7 @@
           <a:p>
             <a:fld id="{2FDC2449-95AC-459F-A23E-20B822D35C3B}" type="slidenum">
               <a:rPr lang="fi-FI" smtClean="0"/>
-              <a:t>‹#›</a:t>
+              <a:t>‹nr.›</a:t>
             </a:fld>
             <a:endParaRPr lang="fi-FI"/>
           </a:p>
@@ -14903,7 +14581,7 @@
           <a:p>
             <a:fld id="{B92AF19A-3A5D-4544-B608-275F196904EE}" type="datetimeFigureOut">
               <a:rPr lang="fi-FI" smtClean="0"/>
-              <a:t>3.3.2020</a:t>
+              <a:t>4.3.2020</a:t>
             </a:fld>
             <a:endParaRPr lang="fi-FI"/>
           </a:p>
@@ -14957,7 +14635,7 @@
           <a:p>
             <a:fld id="{2FDC2449-95AC-459F-A23E-20B822D35C3B}" type="slidenum">
               <a:rPr lang="fi-FI" smtClean="0"/>
-              <a:t>‹#›</a:t>
+              <a:t>‹nr.›</a:t>
             </a:fld>
             <a:endParaRPr lang="fi-FI"/>
           </a:p>
@@ -15315,7 +14993,7 @@
           <a:p>
             <a:fld id="{B92AF19A-3A5D-4544-B608-275F196904EE}" type="datetimeFigureOut">
               <a:rPr lang="fi-FI" smtClean="0"/>
-              <a:t>3.3.2020</a:t>
+              <a:t>4.3.2020</a:t>
             </a:fld>
             <a:endParaRPr lang="fi-FI"/>
           </a:p>
@@ -15369,7 +15047,7 @@
           <a:p>
             <a:fld id="{2FDC2449-95AC-459F-A23E-20B822D35C3B}" type="slidenum">
               <a:rPr lang="fi-FI" smtClean="0"/>
-              <a:t>‹#›</a:t>
+              <a:t>‹nr.›</a:t>
             </a:fld>
             <a:endParaRPr lang="fi-FI"/>
           </a:p>
@@ -15456,7 +15134,7 @@
           <a:p>
             <a:fld id="{B92AF19A-3A5D-4544-B608-275F196904EE}" type="datetimeFigureOut">
               <a:rPr lang="fi-FI" smtClean="0"/>
-              <a:t>3.3.2020</a:t>
+              <a:t>4.3.2020</a:t>
             </a:fld>
             <a:endParaRPr lang="fi-FI"/>
           </a:p>
@@ -15510,7 +15188,7 @@
           <a:p>
             <a:fld id="{2FDC2449-95AC-459F-A23E-20B822D35C3B}" type="slidenum">
               <a:rPr lang="fi-FI" smtClean="0"/>
-              <a:t>‹#›</a:t>
+              <a:t>‹nr.›</a:t>
             </a:fld>
             <a:endParaRPr lang="fi-FI"/>
           </a:p>
@@ -15569,7 +15247,7 @@
           <a:p>
             <a:fld id="{B92AF19A-3A5D-4544-B608-275F196904EE}" type="datetimeFigureOut">
               <a:rPr lang="fi-FI" smtClean="0"/>
-              <a:t>3.3.2020</a:t>
+              <a:t>4.3.2020</a:t>
             </a:fld>
             <a:endParaRPr lang="fi-FI"/>
           </a:p>
@@ -15623,7 +15301,7 @@
           <a:p>
             <a:fld id="{2FDC2449-95AC-459F-A23E-20B822D35C3B}" type="slidenum">
               <a:rPr lang="fi-FI" smtClean="0"/>
-              <a:t>‹#›</a:t>
+              <a:t>‹nr.›</a:t>
             </a:fld>
             <a:endParaRPr lang="fi-FI"/>
           </a:p>
@@ -15880,7 +15558,7 @@
           <a:p>
             <a:fld id="{B92AF19A-3A5D-4544-B608-275F196904EE}" type="datetimeFigureOut">
               <a:rPr lang="fi-FI" smtClean="0"/>
-              <a:t>3.3.2020</a:t>
+              <a:t>4.3.2020</a:t>
             </a:fld>
             <a:endParaRPr lang="fi-FI"/>
           </a:p>
@@ -15934,7 +15612,7 @@
           <a:p>
             <a:fld id="{2FDC2449-95AC-459F-A23E-20B822D35C3B}" type="slidenum">
               <a:rPr lang="fi-FI" smtClean="0"/>
-              <a:t>‹#›</a:t>
+              <a:t>‹nr.›</a:t>
             </a:fld>
             <a:endParaRPr lang="fi-FI"/>
           </a:p>
@@ -16171,7 +15849,7 @@
           <a:p>
             <a:fld id="{B92AF19A-3A5D-4544-B608-275F196904EE}" type="datetimeFigureOut">
               <a:rPr lang="fi-FI" smtClean="0"/>
-              <a:t>3.3.2020</a:t>
+              <a:t>4.3.2020</a:t>
             </a:fld>
             <a:endParaRPr lang="fi-FI"/>
           </a:p>
@@ -16225,7 +15903,7 @@
           <a:p>
             <a:fld id="{2FDC2449-95AC-459F-A23E-20B822D35C3B}" type="slidenum">
               <a:rPr lang="fi-FI" smtClean="0"/>
-              <a:t>‹#›</a:t>
+              <a:t>‹nr.›</a:t>
             </a:fld>
             <a:endParaRPr lang="fi-FI"/>
           </a:p>
@@ -16450,7 +16128,7 @@
           <a:p>
             <a:fld id="{B92AF19A-3A5D-4544-B608-275F196904EE}" type="datetimeFigureOut">
               <a:rPr lang="fi-FI" smtClean="0"/>
-              <a:t>3.3.2020</a:t>
+              <a:t>4.3.2020</a:t>
             </a:fld>
             <a:endParaRPr lang="fi-FI"/>
           </a:p>
@@ -16540,7 +16218,7 @@
           <a:p>
             <a:fld id="{2FDC2449-95AC-459F-A23E-20B822D35C3B}" type="slidenum">
               <a:rPr lang="fi-FI" smtClean="0"/>
-              <a:t>‹#›</a:t>
+              <a:t>‹nr.›</a:t>
             </a:fld>
             <a:endParaRPr lang="fi-FI"/>
           </a:p>
@@ -17636,10 +17314,9 @@
           </a:lstStyle>
           <a:p>
             <a:r>
-              <a:rPr lang="fi-FI" sz="3200" dirty="0" smtClean="0"/>
+              <a:rPr lang="fi-FI" sz="3200" dirty="0"/>
               <a:t>www.involved-it.be</a:t>
             </a:r>
-            <a:endParaRPr lang="fi-FI" sz="3200" dirty="0"/>
           </a:p>
         </p:txBody>
       </p:sp>
@@ -18095,13 +17772,8 @@
             </a:r>
             <a:r>
               <a:rPr lang="nl-BE" dirty="0"/>
-              <a:t> </a:t>
-            </a:r>
-            <a:r>
-              <a:rPr lang="nl-BE" dirty="0" smtClean="0"/>
-              <a:t>1.0</a:t>
-            </a:r>
-            <a:endParaRPr lang="nl-BE" dirty="0"/>
+              <a:t> 1.0</a:t>
+            </a:r>
           </a:p>
           <a:p>
             <a:pPr lvl="1"/>
@@ -18210,13 +17882,6 @@
   <p:clrMapOvr>
     <a:masterClrMapping/>
   </p:clrMapOvr>
-  <p:timing>
-    <p:tnLst>
-      <p:par>
-        <p:cTn id="1" dur="indefinite" restart="never" nodeType="tmRoot"/>
-      </p:par>
-    </p:tnLst>
-  </p:timing>
 </p:sld>
 </file>
 
@@ -19125,13 +18790,6 @@
   <p:clrMapOvr>
     <a:masterClrMapping/>
   </p:clrMapOvr>
-  <p:timing>
-    <p:tnLst>
-      <p:par>
-        <p:cTn id="1" dur="indefinite" restart="never" nodeType="tmRoot"/>
-      </p:par>
-    </p:tnLst>
-  </p:timing>
 </p:sld>
 </file>
 
@@ -19235,22 +18893,18 @@
             </a:r>
             <a:r>
               <a:rPr lang="nl-BE" dirty="0"/>
+              <a:t> 3.0 </a:t>
+            </a:r>
+            <a:r>
+              <a:rPr lang="nl-BE" dirty="0" err="1"/>
+              <a:t>for</a:t>
+            </a:r>
+            <a:r>
+              <a:rPr lang="nl-BE" dirty="0"/>
               <a:t> </a:t>
             </a:r>
             <a:r>
-              <a:rPr lang="nl-BE" dirty="0" smtClean="0"/>
-              <a:t>3.0 </a:t>
-            </a:r>
-            <a:r>
-              <a:rPr lang="nl-BE" dirty="0" err="1" smtClean="0"/>
-              <a:t>for</a:t>
-            </a:r>
-            <a:r>
-              <a:rPr lang="nl-BE" dirty="0" smtClean="0"/>
-              <a:t> </a:t>
-            </a:r>
-            <a:r>
-              <a:rPr lang="nl-BE" dirty="0" err="1" smtClean="0"/>
+              <a:rPr lang="nl-BE" dirty="0" err="1"/>
               <a:t>serialization</a:t>
             </a:r>
             <a:endParaRPr lang="nl-BE" dirty="0"/>
@@ -19344,13 +18998,6 @@
   <p:clrMapOvr>
     <a:masterClrMapping/>
   </p:clrMapOvr>
-  <p:timing>
-    <p:tnLst>
-      <p:par>
-        <p:cTn id="1" dur="indefinite" restart="never" nodeType="tmRoot"/>
-      </p:par>
-    </p:tnLst>
-  </p:timing>
 </p:sld>
 </file>
 
@@ -20134,21 +19781,16 @@
           <a:p>
             <a:r>
               <a:rPr lang="nl-BE" sz="2400" dirty="0"/>
-              <a:t>OpenSource Remote Procedure Call </a:t>
-            </a:r>
-            <a:r>
-              <a:rPr lang="nl-BE" sz="2400" dirty="0" smtClean="0"/>
-              <a:t>system </a:t>
-            </a:r>
-            <a:r>
-              <a:rPr lang="nl-BE" sz="2400" dirty="0" err="1" smtClean="0"/>
+              <a:t>OpenSource Remote Procedure Call system </a:t>
+            </a:r>
+            <a:r>
+              <a:rPr lang="nl-BE" sz="2400" dirty="0" err="1"/>
               <a:t>by</a:t>
             </a:r>
             <a:r>
-              <a:rPr lang="nl-BE" sz="2400" dirty="0" smtClean="0"/>
+              <a:rPr lang="nl-BE" sz="2400" dirty="0"/>
               <a:t> Google</a:t>
             </a:r>
-            <a:endParaRPr lang="nl-BE" sz="2400" dirty="0"/>
           </a:p>
           <a:p>
             <a:r>
@@ -20191,11 +19833,7 @@
             </a:r>
             <a:r>
               <a:rPr lang="nl-BE" sz="2400" dirty="0"/>
-              <a:t> </a:t>
-            </a:r>
-            <a:r>
-              <a:rPr lang="nl-BE" sz="2400" dirty="0" smtClean="0"/>
-              <a:t>IIS</a:t>
+              <a:t> IIS</a:t>
             </a:r>
           </a:p>
           <a:p>
@@ -20237,18 +19875,13 @@
               <a:t> </a:t>
             </a:r>
             <a:r>
-              <a:rPr lang="nl-BE" sz="2000" dirty="0" err="1" smtClean="0"/>
+              <a:rPr lang="nl-BE" sz="2000" dirty="0" err="1"/>
               <a:t>January</a:t>
             </a:r>
             <a:r>
-              <a:rPr lang="nl-BE" sz="2000" dirty="0" smtClean="0"/>
-              <a:t> </a:t>
-            </a:r>
-            <a:r>
               <a:rPr lang="nl-BE" sz="2000" dirty="0"/>
-              <a:t>27th, 2020 </a:t>
-            </a:r>
-            <a:endParaRPr lang="nl-BE" sz="2000" dirty="0" smtClean="0"/>
+              <a:t> 27th, 2020 </a:t>
+            </a:r>
           </a:p>
           <a:p>
             <a:endParaRPr lang="nl-BE" sz="2400" dirty="0"/>
@@ -21053,22 +20686,14 @@
             </a:r>
             <a:r>
               <a:rPr lang="nl-BE" dirty="0"/>
-              <a:t> </a:t>
-            </a:r>
-            <a:r>
-              <a:rPr lang="nl-BE" dirty="0" smtClean="0"/>
-              <a:t>features</a:t>
+              <a:t> features</a:t>
             </a:r>
           </a:p>
           <a:p>
             <a:pPr lvl="1"/>
             <a:r>
-              <a:rPr lang="nl-BE" dirty="0" smtClean="0"/>
-              <a:t>Ranges </a:t>
-            </a:r>
-            <a:r>
               <a:rPr lang="nl-BE" dirty="0"/>
-              <a:t>and Indices</a:t>
+              <a:t>Ranges and Indices</a:t>
             </a:r>
           </a:p>
           <a:p>
@@ -21078,31 +20703,27 @@
               <a:t>Async streams (</a:t>
             </a:r>
             <a:r>
-              <a:rPr lang="nl-BE" dirty="0" err="1" smtClean="0"/>
+              <a:rPr lang="nl-BE" dirty="0" err="1"/>
               <a:t>iterators</a:t>
             </a:r>
             <a:r>
-              <a:rPr lang="nl-BE" dirty="0" smtClean="0"/>
+              <a:rPr lang="nl-BE" dirty="0"/>
               <a:t>)</a:t>
             </a:r>
           </a:p>
           <a:p>
             <a:pPr lvl="1"/>
             <a:r>
-              <a:rPr lang="nl-BE" dirty="0" smtClean="0"/>
+              <a:rPr lang="nl-BE" dirty="0"/>
               <a:t>Platform-</a:t>
             </a:r>
             <a:r>
-              <a:rPr lang="nl-BE" dirty="0" err="1" smtClean="0"/>
+              <a:rPr lang="nl-BE" dirty="0" err="1"/>
               <a:t>Dependent</a:t>
             </a:r>
             <a:r>
-              <a:rPr lang="nl-BE" dirty="0" smtClean="0"/>
-              <a:t> </a:t>
-            </a:r>
-            <a:r>
               <a:rPr lang="nl-BE" dirty="0"/>
-              <a:t>Intrinsics</a:t>
+              <a:t> Intrinsics</a:t>
             </a:r>
           </a:p>
           <a:p>
@@ -21446,15 +21067,7 @@
             </a:r>
             <a:r>
               <a:rPr lang="nl-BE" dirty="0"/>
-              <a:t> </a:t>
-            </a:r>
-            <a:r>
-              <a:rPr lang="nl-BE" dirty="0" smtClean="0"/>
-              <a:t>(Docker) </a:t>
-            </a:r>
-            <a:r>
-              <a:rPr lang="nl-BE" dirty="0"/>
-              <a:t>containers</a:t>
+              <a:t> (Docker) containers</a:t>
             </a:r>
           </a:p>
           <a:p>
@@ -21477,16 +21090,12 @@
               <a:t> </a:t>
             </a:r>
             <a:r>
-              <a:rPr lang="nl-BE" dirty="0" err="1" smtClean="0"/>
+              <a:rPr lang="nl-BE" dirty="0" err="1"/>
               <a:t>using</a:t>
             </a:r>
             <a:r>
-              <a:rPr lang="nl-BE" dirty="0" smtClean="0"/>
-              <a:t> </a:t>
-            </a:r>
-            <a:r>
               <a:rPr lang="nl-BE" dirty="0"/>
-              <a:t>systemd</a:t>
+              <a:t> systemd</a:t>
             </a:r>
           </a:p>
         </p:txBody>
@@ -21960,32 +21569,27 @@
           <a:p>
             <a:r>
               <a:rPr lang="nl-BE" dirty="0"/>
-              <a:t>Only on </a:t>
-            </a:r>
-            <a:r>
-              <a:rPr lang="nl-BE" dirty="0" smtClean="0"/>
-              <a:t>Windows</a:t>
+              <a:t>Only on Windows</a:t>
             </a:r>
           </a:p>
           <a:p>
             <a:pPr lvl="1"/>
             <a:r>
-              <a:rPr lang="nl-BE" dirty="0" err="1" smtClean="0"/>
+              <a:rPr lang="nl-BE" dirty="0" err="1"/>
               <a:t>Wrapper</a:t>
             </a:r>
             <a:r>
-              <a:rPr lang="nl-BE" dirty="0" smtClean="0"/>
+              <a:rPr lang="nl-BE" dirty="0"/>
               <a:t> on top op Windows DirectX </a:t>
             </a:r>
             <a:r>
-              <a:rPr lang="nl-BE" dirty="0" err="1" smtClean="0"/>
+              <a:rPr lang="nl-BE" dirty="0" err="1"/>
               <a:t>and</a:t>
             </a:r>
             <a:r>
-              <a:rPr lang="nl-BE" dirty="0" smtClean="0"/>
+              <a:rPr lang="nl-BE" dirty="0"/>
               <a:t> GDI+ apis</a:t>
             </a:r>
-            <a:endParaRPr lang="nl-BE" dirty="0"/>
           </a:p>
           <a:p>
             <a:r>
@@ -21999,14 +21603,13 @@
               <a:t>WinForms designer only included in Visual Studio 2019 as a preview </a:t>
             </a:r>
             <a:r>
-              <a:rPr lang="nl-BE" dirty="0" err="1" smtClean="0"/>
+              <a:rPr lang="nl-BE" dirty="0" err="1"/>
               <a:t>externsion</a:t>
             </a:r>
             <a:r>
-              <a:rPr lang="nl-BE" dirty="0" smtClean="0"/>
+              <a:rPr lang="nl-BE" dirty="0"/>
               <a:t> (VSIX)</a:t>
             </a:r>
-            <a:endParaRPr lang="nl-BE" dirty="0"/>
           </a:p>
           <a:p>
             <a:endParaRPr lang="nl-BE" dirty="0"/>
@@ -22443,24 +22046,23 @@
               <a:buNone/>
             </a:pPr>
             <a:r>
-              <a:rPr lang="nl-BE" dirty="0" smtClean="0"/>
+              <a:rPr lang="nl-BE" dirty="0"/>
               <a:t>johnny.hooyberghs@involved-it.be</a:t>
             </a:r>
-            <a:endParaRPr lang="nl-BE" dirty="0"/>
           </a:p>
           <a:p>
             <a:pPr marL="0" indent="0" algn="ctr">
               <a:buNone/>
             </a:pPr>
             <a:r>
-              <a:rPr lang="nl-BE" dirty="0" smtClean="0"/>
+              <a:rPr lang="nl-BE" dirty="0"/>
               <a:t>@</a:t>
             </a:r>
             <a:r>
-              <a:rPr lang="nl-BE" dirty="0" err="1" smtClean="0"/>
+              <a:rPr lang="nl-BE" dirty="0" err="1"/>
               <a:t>djohnnieke</a:t>
             </a:r>
-            <a:endParaRPr lang="nl-BE" dirty="0" smtClean="0"/>
+            <a:endParaRPr lang="nl-BE" dirty="0"/>
           </a:p>
           <a:p>
             <a:pPr marL="0" indent="0" algn="ctr">
@@ -22468,11 +22070,7 @@
             </a:pPr>
             <a:r>
               <a:rPr lang="nl-BE" dirty="0"/>
-              <a:t>https://</a:t>
-            </a:r>
-            <a:r>
-              <a:rPr lang="nl-BE" dirty="0" smtClean="0"/>
-              <a:t>github.com/Djohnnie</a:t>
+              <a:t>https://github.com/Djohnnie</a:t>
             </a:r>
           </a:p>
           <a:p>
@@ -22776,10 +22374,9 @@
           </a:lstStyle>
           <a:p>
             <a:r>
-              <a:rPr lang="fi-FI" sz="3200" dirty="0" smtClean="0"/>
+              <a:rPr lang="fi-FI" sz="3200" dirty="0"/>
               <a:t>www.involved-it.be</a:t>
             </a:r>
-            <a:endParaRPr lang="fi-FI" sz="3200" dirty="0"/>
           </a:p>
         </p:txBody>
       </p:sp>
@@ -22899,24 +22496,23 @@
               <a:buNone/>
             </a:pPr>
             <a:r>
-              <a:rPr lang="nl-BE" dirty="0" smtClean="0"/>
+              <a:rPr lang="nl-BE" dirty="0"/>
               <a:t>johnny.hooyberghs@involved-it.be</a:t>
             </a:r>
-            <a:endParaRPr lang="nl-BE" dirty="0"/>
           </a:p>
           <a:p>
             <a:pPr marL="0" indent="0" algn="ctr">
               <a:buNone/>
             </a:pPr>
             <a:r>
-              <a:rPr lang="nl-BE" dirty="0" smtClean="0"/>
+              <a:rPr lang="nl-BE" dirty="0"/>
               <a:t>@</a:t>
             </a:r>
             <a:r>
-              <a:rPr lang="nl-BE" dirty="0" err="1" smtClean="0"/>
+              <a:rPr lang="nl-BE" dirty="0" err="1"/>
               <a:t>djohnnieke</a:t>
             </a:r>
-            <a:endParaRPr lang="nl-BE" dirty="0" smtClean="0"/>
+            <a:endParaRPr lang="nl-BE" dirty="0"/>
           </a:p>
           <a:p>
             <a:pPr marL="0" indent="0" algn="ctr">
@@ -22924,11 +22520,7 @@
             </a:pPr>
             <a:r>
               <a:rPr lang="nl-BE" dirty="0"/>
-              <a:t>https://</a:t>
-            </a:r>
-            <a:r>
-              <a:rPr lang="nl-BE" dirty="0" smtClean="0"/>
-              <a:t>github.com/Djohnnie</a:t>
+              <a:t>https://github.com/Djohnnie</a:t>
             </a:r>
           </a:p>
           <a:p>
@@ -23270,10 +22862,9 @@
           </a:lstStyle>
           <a:p>
             <a:r>
-              <a:rPr lang="fi-FI" sz="3200" dirty="0" smtClean="0"/>
+              <a:rPr lang="fi-FI" sz="3200" dirty="0"/>
               <a:t>www.involved-it.be</a:t>
             </a:r>
-            <a:endParaRPr lang="fi-FI" sz="3200" dirty="0"/>
           </a:p>
         </p:txBody>
       </p:sp>
@@ -25314,13 +24905,6 @@
   <p:clrMapOvr>
     <a:masterClrMapping/>
   </p:clrMapOvr>
-  <p:timing>
-    <p:tnLst>
-      <p:par>
-        <p:cTn id="1" dur="indefinite" restart="never" nodeType="tmRoot"/>
-      </p:par>
-    </p:tnLst>
-  </p:timing>
 </p:sld>
 </file>
 
@@ -27106,13 +26690,6 @@
   <p:clrMapOvr>
     <a:masterClrMapping/>
   </p:clrMapOvr>
-  <p:timing>
-    <p:tnLst>
-      <p:par>
-        <p:cTn id="1" dur="indefinite" restart="never" nodeType="tmRoot"/>
-      </p:par>
-    </p:tnLst>
-  </p:timing>
 </p:sld>
 </file>
 
@@ -27324,13 +26901,6 @@
   <p:clrMapOvr>
     <a:masterClrMapping/>
   </p:clrMapOvr>
-  <p:timing>
-    <p:tnLst>
-      <p:par>
-        <p:cTn id="1" dur="indefinite" restart="never" nodeType="tmRoot"/>
-      </p:par>
-    </p:tnLst>
-  </p:timing>
 </p:sld>
 </file>
 
@@ -27430,13 +27000,6 @@
   <p:clrMapOvr>
     <a:masterClrMapping/>
   </p:clrMapOvr>
-  <p:timing>
-    <p:tnLst>
-      <p:par>
-        <p:cTn id="1" dur="indefinite" restart="never" nodeType="tmRoot"/>
-      </p:par>
-    </p:tnLst>
-  </p:timing>
 </p:sld>
 </file>
 
@@ -27544,12 +27107,8 @@
           </a:p>
           <a:p>
             <a:r>
-              <a:rPr lang="nl-BE" dirty="0" smtClean="0"/>
-              <a:t>DLL </a:t>
-            </a:r>
-            <a:r>
               <a:rPr lang="nl-BE" dirty="0"/>
-              <a:t>that can </a:t>
+              <a:t>DLL that can </a:t>
             </a:r>
             <a:r>
               <a:rPr lang="nl-BE" dirty="0" err="1"/>
@@ -27560,60 +27119,56 @@
               <a:t> </a:t>
             </a:r>
             <a:r>
-              <a:rPr lang="nl-BE" dirty="0" err="1" smtClean="0"/>
+              <a:rPr lang="nl-BE" dirty="0" err="1"/>
               <a:t>executed</a:t>
             </a:r>
             <a:r>
-              <a:rPr lang="nl-BE" dirty="0" smtClean="0"/>
+              <a:rPr lang="nl-BE" dirty="0"/>
               <a:t> </a:t>
             </a:r>
             <a:r>
-              <a:rPr lang="nl-BE" dirty="0" err="1" smtClean="0"/>
+              <a:rPr lang="nl-BE" dirty="0" err="1"/>
               <a:t>using</a:t>
             </a:r>
             <a:r>
-              <a:rPr lang="nl-BE" dirty="0" smtClean="0"/>
+              <a:rPr lang="nl-BE" dirty="0"/>
               <a:t> “</a:t>
             </a:r>
             <a:r>
-              <a:rPr lang="nl-BE" dirty="0" err="1" smtClean="0"/>
+              <a:rPr lang="nl-BE" dirty="0" err="1"/>
               <a:t>dotnet</a:t>
             </a:r>
             <a:r>
-              <a:rPr lang="nl-BE" dirty="0" smtClean="0"/>
+              <a:rPr lang="nl-BE" dirty="0"/>
               <a:t>”</a:t>
             </a:r>
           </a:p>
           <a:p>
             <a:pPr lvl="1"/>
             <a:r>
-              <a:rPr lang="nl-BE" dirty="0" smtClean="0"/>
+              <a:rPr lang="nl-BE" dirty="0"/>
               <a:t>platform independent</a:t>
             </a:r>
           </a:p>
           <a:p>
             <a:r>
-              <a:rPr lang="nl-BE" dirty="0" smtClean="0"/>
+              <a:rPr lang="nl-BE" dirty="0"/>
+              <a:t>Platform SDK decides how to build native </a:t>
+            </a:r>
+            <a:r>
+              <a:rPr lang="nl-BE" dirty="0" err="1"/>
+              <a:t>executable</a:t>
+            </a:r>
+            <a:endParaRPr lang="nl-BE" dirty="0"/>
+          </a:p>
+          <a:p>
+            <a:pPr lvl="1"/>
+            <a:r>
+              <a:rPr lang="nl-BE" dirty="0"/>
               <a:t>Platform </a:t>
             </a:r>
             <a:r>
-              <a:rPr lang="nl-BE" dirty="0"/>
-              <a:t>SDK decides how to build native </a:t>
-            </a:r>
-            <a:r>
-              <a:rPr lang="nl-BE" dirty="0" err="1" smtClean="0"/>
-              <a:t>executable</a:t>
-            </a:r>
-            <a:endParaRPr lang="nl-BE" dirty="0" smtClean="0"/>
-          </a:p>
-          <a:p>
-            <a:pPr lvl="1"/>
-            <a:r>
-              <a:rPr lang="nl-BE" dirty="0" smtClean="0"/>
-              <a:t>Platform </a:t>
-            </a:r>
-            <a:r>
-              <a:rPr lang="nl-BE" dirty="0" err="1" smtClean="0"/>
+              <a:rPr lang="nl-BE" dirty="0" err="1"/>
               <a:t>dependent</a:t>
             </a:r>
             <a:endParaRPr lang="nl-BE" dirty="0"/>
@@ -27674,13 +27229,6 @@
   <p:clrMapOvr>
     <a:masterClrMapping/>
   </p:clrMapOvr>
-  <p:timing>
-    <p:tnLst>
-      <p:par>
-        <p:cTn id="1" dur="indefinite" restart="never" nodeType="tmRoot"/>
-      </p:par>
-    </p:tnLst>
-  </p:timing>
 </p:sld>
 </file>
 
@@ -27942,7 +27490,7 @@
         </p:nvSpPr>
         <p:spPr>
           <a:xfrm>
-            <a:off x="4692770" y="2803585"/>
+            <a:off x="4692770" y="3300739"/>
             <a:ext cx="6728604" cy="275719"/>
           </a:xfrm>
           <a:prstGeom prst="ellipse">
@@ -28155,15 +27703,15 @@
               <a:t>Includes .NET </a:t>
             </a:r>
             <a:r>
-              <a:rPr lang="nl-BE" dirty="0" err="1" smtClean="0"/>
+              <a:rPr lang="nl-BE" dirty="0" err="1"/>
               <a:t>Core</a:t>
             </a:r>
             <a:r>
-              <a:rPr lang="nl-BE" dirty="0" smtClean="0"/>
+              <a:rPr lang="nl-BE" dirty="0"/>
               <a:t> </a:t>
             </a:r>
             <a:r>
-              <a:rPr lang="nl-BE" dirty="0" err="1" smtClean="0"/>
+              <a:rPr lang="nl-BE" dirty="0" err="1"/>
               <a:t>runtime</a:t>
             </a:r>
             <a:endParaRPr lang="nl-BE" dirty="0"/>
@@ -28827,12 +28375,6 @@
 </file>
 
 <file path=customXml/item1.xml><?xml version="1.0" encoding="utf-8"?>
-<p:properties xmlns:p="http://schemas.microsoft.com/office/2006/metadata/properties" xmlns:xsi="http://www.w3.org/2001/XMLSchema-instance" xmlns:pc="http://schemas.microsoft.com/office/infopath/2007/PartnerControls">
-  <documentManagement/>
-</p:properties>
-</file>
-
-<file path=customXml/item2.xml><?xml version="1.0" encoding="utf-8"?>
 <ct:contentTypeSchema xmlns:ct="http://schemas.microsoft.com/office/2006/metadata/contentType" xmlns:ma="http://schemas.microsoft.com/office/2006/metadata/properties/metaAttributes" ct:_="" ma:_="" ma:contentTypeName="Asiakirja" ma:contentTypeID="0x010100AD3B108813893342A29AE786A13A103D" ma:contentTypeVersion="13" ma:contentTypeDescription="Luo uusi asiakirja." ma:contentTypeScope="" ma:versionID="6a0283d9cdd2e5f75042720ea40fd066">
   <xsd:schema xmlns:xsd="http://www.w3.org/2001/XMLSchema" xmlns:xs="http://www.w3.org/2001/XMLSchema" xmlns:p="http://schemas.microsoft.com/office/2006/metadata/properties" xmlns:ns3="056cce87-014d-41bc-9da7-4bab5e65d043" xmlns:ns4="53d80cf1-60ec-4234-9036-b6961cba4c45" targetNamespace="http://schemas.microsoft.com/office/2006/metadata/properties" ma:root="true" ma:fieldsID="5630c78c50fa8eb1d02b9a760dde0348" ns3:_="" ns4:_="">
     <xsd:import namespace="056cce87-014d-41bc-9da7-4bab5e65d043"/>
@@ -29055,6 +28597,12 @@
 </ct:contentTypeSchema>
 </file>
 
+<file path=customXml/item2.xml><?xml version="1.0" encoding="utf-8"?>
+<p:properties xmlns:p="http://schemas.microsoft.com/office/2006/metadata/properties" xmlns:xsi="http://www.w3.org/2001/XMLSchema-instance" xmlns:pc="http://schemas.microsoft.com/office/infopath/2007/PartnerControls">
+  <documentManagement/>
+</p:properties>
+</file>
+
 <file path=customXml/item3.xml><?xml version="1.0" encoding="utf-8"?>
 <?mso-contentType ?>
 <FormTemplates xmlns="http://schemas.microsoft.com/sharepoint/v3/contenttype/forms">
@@ -29065,23 +28613,6 @@
 </file>
 
 <file path=customXml/itemProps1.xml><?xml version="1.0" encoding="utf-8"?>
-<ds:datastoreItem xmlns:ds="http://schemas.openxmlformats.org/officeDocument/2006/customXml" ds:itemID="{0C327601-A388-4226-A4EC-4C3E57ECDF6B}">
-  <ds:schemaRefs>
-    <ds:schemaRef ds:uri="http://purl.org/dc/terms/"/>
-    <ds:schemaRef ds:uri="http://schemas.microsoft.com/office/2006/documentManagement/types"/>
-    <ds:schemaRef ds:uri="53d80cf1-60ec-4234-9036-b6961cba4c45"/>
-    <ds:schemaRef ds:uri="http://schemas.openxmlformats.org/package/2006/metadata/core-properties"/>
-    <ds:schemaRef ds:uri="http://purl.org/dc/elements/1.1/"/>
-    <ds:schemaRef ds:uri="http://schemas.microsoft.com/office/2006/metadata/properties"/>
-    <ds:schemaRef ds:uri="http://www.w3.org/XML/1998/namespace"/>
-    <ds:schemaRef ds:uri="http://schemas.microsoft.com/office/infopath/2007/PartnerControls"/>
-    <ds:schemaRef ds:uri="056cce87-014d-41bc-9da7-4bab5e65d043"/>
-    <ds:schemaRef ds:uri="http://purl.org/dc/dcmitype/"/>
-  </ds:schemaRefs>
-</ds:datastoreItem>
-</file>
-
-<file path=customXml/itemProps2.xml><?xml version="1.0" encoding="utf-8"?>
 <ds:datastoreItem xmlns:ds="http://schemas.openxmlformats.org/officeDocument/2006/customXml" ds:itemID="{370C2BF7-C2D6-4517-B6DF-FFC616A54AA4}">
   <ds:schemaRefs>
     <ds:schemaRef ds:uri="http://schemas.microsoft.com/office/2006/metadata/contentType"/>
@@ -29100,6 +28631,23 @@
 </ds:datastoreItem>
 </file>
 
+<file path=customXml/itemProps2.xml><?xml version="1.0" encoding="utf-8"?>
+<ds:datastoreItem xmlns:ds="http://schemas.openxmlformats.org/officeDocument/2006/customXml" ds:itemID="{0C327601-A388-4226-A4EC-4C3E57ECDF6B}">
+  <ds:schemaRefs>
+    <ds:schemaRef ds:uri="http://purl.org/dc/terms/"/>
+    <ds:schemaRef ds:uri="http://schemas.microsoft.com/office/2006/documentManagement/types"/>
+    <ds:schemaRef ds:uri="53d80cf1-60ec-4234-9036-b6961cba4c45"/>
+    <ds:schemaRef ds:uri="http://schemas.openxmlformats.org/package/2006/metadata/core-properties"/>
+    <ds:schemaRef ds:uri="http://purl.org/dc/elements/1.1/"/>
+    <ds:schemaRef ds:uri="http://schemas.microsoft.com/office/2006/metadata/properties"/>
+    <ds:schemaRef ds:uri="http://www.w3.org/XML/1998/namespace"/>
+    <ds:schemaRef ds:uri="http://schemas.microsoft.com/office/infopath/2007/PartnerControls"/>
+    <ds:schemaRef ds:uri="056cce87-014d-41bc-9da7-4bab5e65d043"/>
+    <ds:schemaRef ds:uri="http://purl.org/dc/dcmitype/"/>
+  </ds:schemaRefs>
+</ds:datastoreItem>
+</file>
+
 <file path=customXml/itemProps3.xml><?xml version="1.0" encoding="utf-8"?>
 <ds:datastoreItem xmlns:ds="http://schemas.openxmlformats.org/officeDocument/2006/customXml" ds:itemID="{76CA5F9D-BF38-41BB-B2AC-B24301EB97E5}">
   <ds:schemaRefs>

</xml_diff>